<commit_message>
- Update property name
</commit_message>
<xml_diff>
--- a/screenshots/illustrations.pptx
+++ b/screenshots/illustrations.pptx
@@ -13,6 +13,11 @@
     <p:sldId id="261" r:id="rId7"/>
     <p:sldId id="262" r:id="rId8"/>
     <p:sldId id="263" r:id="rId9"/>
+    <p:sldId id="264" r:id="rId10"/>
+    <p:sldId id="265" r:id="rId11"/>
+    <p:sldId id="266" r:id="rId12"/>
+    <p:sldId id="267" r:id="rId13"/>
+    <p:sldId id="268" r:id="rId14"/>
   </p:sldIdLst>
   <p:sldSz cx="14295438" cy="8961438"/>
   <p:notesSz cx="6858000" cy="9144000"/>
@@ -163,6 +168,38 @@
 </p:cmLst>
 </file>
 
+<file path=ppt/comments/comment2.xml><?xml version="1.0" encoding="utf-8"?>
+<p:cmLst xmlns:a="http://schemas.openxmlformats.org/drawingml/2006/main" xmlns:r="http://schemas.openxmlformats.org/officeDocument/2006/relationships" xmlns:p="http://schemas.openxmlformats.org/presentationml/2006/main">
+  <p:cm authorId="1" dt="2020-07-26T16:00:49.894" idx="1">
+    <p:pos x="10" y="10"/>
+    <p:text> context.launchCountryPickerDialog(
+            customMasterCountries = "IN,AD,GE,CZ,US,GB,AL,NZ",
+            customExcludedCountries = "HU,KM",
+            countryFileReader = dataFileReader,
+            useCache = false,
+            customDataStoreModifier = { dataStore -&gt; /*Modify dataStore*/ },
+            preferredCountryCodes = "GE,CZ",
+            cpFlagProvider = flagProvider,
+            primaryTextGenerator = { country -&gt; country.name },
+            secondaryTextGenerator = { country -&gt; country.capitalEnglishName },
+            highlightedTextGenerator = { country -&gt; country.alpha2 },
+            dialogViewIds = customDialogViewIds,
+            allowSearch = false,
+            allowClearSelection = true,
+            showTitle = false,
+            showFullScreen = true
+        ) { selectedCountry: CPCountry? -&gt;
+            // your code to handle selected country
+        }</p:text>
+    <p:extLst>
+      <p:ext uri="{C676402C-5697-4E1C-873F-D02D1690AC5C}">
+        <p15:threadingInfo xmlns:p15="http://schemas.microsoft.com/office/powerpoint/2012/main" timeZoneBias="360"/>
+      </p:ext>
+    </p:extLst>
+  </p:cm>
+</p:cmLst>
+</file>
+
 <file path=ppt/slideLayouts/slideLayout1.xml><?xml version="1.0" encoding="utf-8"?>
 <p:sldLayout xmlns:a="http://schemas.openxmlformats.org/drawingml/2006/main" xmlns:r="http://schemas.openxmlformats.org/officeDocument/2006/relationships" xmlns:p="http://schemas.openxmlformats.org/presentationml/2006/main" type="title" preserve="1">
   <p:cSld name="Title Slide">
@@ -294,7 +331,7 @@
           <a:p>
             <a:fld id="{DE445829-999B-C541-B650-834B79ECAD54}" type="datetimeFigureOut">
               <a:rPr lang="en-US" smtClean="0"/>
-              <a:t>7/25/20</a:t>
+              <a:t>8/8/20</a:t>
             </a:fld>
             <a:endParaRPr lang="en-US"/>
           </a:p>
@@ -464,7 +501,7 @@
           <a:p>
             <a:fld id="{DE445829-999B-C541-B650-834B79ECAD54}" type="datetimeFigureOut">
               <a:rPr lang="en-US" smtClean="0"/>
-              <a:t>7/25/20</a:t>
+              <a:t>8/8/20</a:t>
             </a:fld>
             <a:endParaRPr lang="en-US"/>
           </a:p>
@@ -644,7 +681,7 @@
           <a:p>
             <a:fld id="{DE445829-999B-C541-B650-834B79ECAD54}" type="datetimeFigureOut">
               <a:rPr lang="en-US" smtClean="0"/>
-              <a:t>7/25/20</a:t>
+              <a:t>8/8/20</a:t>
             </a:fld>
             <a:endParaRPr lang="en-US"/>
           </a:p>
@@ -814,7 +851,7 @@
           <a:p>
             <a:fld id="{DE445829-999B-C541-B650-834B79ECAD54}" type="datetimeFigureOut">
               <a:rPr lang="en-US" smtClean="0"/>
-              <a:t>7/25/20</a:t>
+              <a:t>8/8/20</a:t>
             </a:fld>
             <a:endParaRPr lang="en-US"/>
           </a:p>
@@ -1060,7 +1097,7 @@
           <a:p>
             <a:fld id="{DE445829-999B-C541-B650-834B79ECAD54}" type="datetimeFigureOut">
               <a:rPr lang="en-US" smtClean="0"/>
-              <a:t>7/25/20</a:t>
+              <a:t>8/8/20</a:t>
             </a:fld>
             <a:endParaRPr lang="en-US"/>
           </a:p>
@@ -1292,7 +1329,7 @@
           <a:p>
             <a:fld id="{DE445829-999B-C541-B650-834B79ECAD54}" type="datetimeFigureOut">
               <a:rPr lang="en-US" smtClean="0"/>
-              <a:t>7/25/20</a:t>
+              <a:t>8/8/20</a:t>
             </a:fld>
             <a:endParaRPr lang="en-US"/>
           </a:p>
@@ -1659,7 +1696,7 @@
           <a:p>
             <a:fld id="{DE445829-999B-C541-B650-834B79ECAD54}" type="datetimeFigureOut">
               <a:rPr lang="en-US" smtClean="0"/>
-              <a:t>7/25/20</a:t>
+              <a:t>8/8/20</a:t>
             </a:fld>
             <a:endParaRPr lang="en-US"/>
           </a:p>
@@ -1777,7 +1814,7 @@
           <a:p>
             <a:fld id="{DE445829-999B-C541-B650-834B79ECAD54}" type="datetimeFigureOut">
               <a:rPr lang="en-US" smtClean="0"/>
-              <a:t>7/25/20</a:t>
+              <a:t>8/8/20</a:t>
             </a:fld>
             <a:endParaRPr lang="en-US"/>
           </a:p>
@@ -1872,7 +1909,7 @@
           <a:p>
             <a:fld id="{DE445829-999B-C541-B650-834B79ECAD54}" type="datetimeFigureOut">
               <a:rPr lang="en-US" smtClean="0"/>
-              <a:t>7/25/20</a:t>
+              <a:t>8/8/20</a:t>
             </a:fld>
             <a:endParaRPr lang="en-US"/>
           </a:p>
@@ -2149,7 +2186,7 @@
           <a:p>
             <a:fld id="{DE445829-999B-C541-B650-834B79ECAD54}" type="datetimeFigureOut">
               <a:rPr lang="en-US" smtClean="0"/>
-              <a:t>7/25/20</a:t>
+              <a:t>8/8/20</a:t>
             </a:fld>
             <a:endParaRPr lang="en-US"/>
           </a:p>
@@ -2406,7 +2443,7 @@
           <a:p>
             <a:fld id="{DE445829-999B-C541-B650-834B79ECAD54}" type="datetimeFigureOut">
               <a:rPr lang="en-US" smtClean="0"/>
-              <a:t>7/25/20</a:t>
+              <a:t>8/8/20</a:t>
             </a:fld>
             <a:endParaRPr lang="en-US"/>
           </a:p>
@@ -2619,7 +2656,7 @@
           <a:p>
             <a:fld id="{DE445829-999B-C541-B650-834B79ECAD54}" type="datetimeFigureOut">
               <a:rPr lang="en-US" smtClean="0"/>
-              <a:t>7/25/20</a:t>
+              <a:t>8/8/20</a:t>
             </a:fld>
             <a:endParaRPr lang="en-US"/>
           </a:p>
@@ -4014,6 +4051,3069 @@
     <p:extLst>
       <p:ext uri="{BB962C8B-B14F-4D97-AF65-F5344CB8AC3E}">
         <p14:creationId xmlns:p14="http://schemas.microsoft.com/office/powerpoint/2010/main" val="879552979"/>
+      </p:ext>
+    </p:extLst>
+  </p:cSld>
+  <p:clrMapOvr>
+    <a:masterClrMapping/>
+  </p:clrMapOvr>
+</p:sld>
+</file>
+
+<file path=ppt/slides/slide10.xml><?xml version="1.0" encoding="utf-8"?>
+<p:sld xmlns:a="http://schemas.openxmlformats.org/drawingml/2006/main" xmlns:r="http://schemas.openxmlformats.org/officeDocument/2006/relationships" xmlns:p="http://schemas.openxmlformats.org/presentationml/2006/main">
+  <p:cSld>
+    <p:spTree>
+      <p:nvGrpSpPr>
+        <p:cNvPr id="1" name=""/>
+        <p:cNvGrpSpPr/>
+        <p:nvPr/>
+      </p:nvGrpSpPr>
+      <p:grpSpPr>
+        <a:xfrm>
+          <a:off x="0" y="0"/>
+          <a:ext cx="0" cy="0"/>
+          <a:chOff x="0" y="0"/>
+          <a:chExt cx="0" cy="0"/>
+        </a:xfrm>
+      </p:grpSpPr>
+      <p:grpSp>
+        <p:nvGrpSpPr>
+          <p:cNvPr id="19" name="Group 18">
+            <a:extLst>
+              <a:ext uri="{FF2B5EF4-FFF2-40B4-BE49-F238E27FC236}">
+                <a16:creationId xmlns:a16="http://schemas.microsoft.com/office/drawing/2014/main" id="{9A5E19BC-5566-6249-B89B-8EB824773D0F}"/>
+              </a:ext>
+            </a:extLst>
+          </p:cNvPr>
+          <p:cNvGrpSpPr/>
+          <p:nvPr/>
+        </p:nvGrpSpPr>
+        <p:grpSpPr>
+          <a:xfrm>
+            <a:off x="5775817" y="1411428"/>
+            <a:ext cx="7235135" cy="6882063"/>
+            <a:chOff x="2133716" y="806994"/>
+            <a:chExt cx="7235135" cy="6882063"/>
+          </a:xfrm>
+        </p:grpSpPr>
+        <p:pic>
+          <p:nvPicPr>
+            <p:cNvPr id="4" name="Picture 3" descr="A screenshot of a cell phone&#10;&#10;Description automatically generated">
+              <a:extLst>
+                <a:ext uri="{FF2B5EF4-FFF2-40B4-BE49-F238E27FC236}">
+                  <a16:creationId xmlns:a16="http://schemas.microsoft.com/office/drawing/2014/main" id="{D2904C2C-DEC2-A64A-B896-1832192A1574}"/>
+                </a:ext>
+              </a:extLst>
+            </p:cNvPr>
+            <p:cNvPicPr>
+              <a:picLocks noChangeAspect="1"/>
+            </p:cNvPicPr>
+            <p:nvPr/>
+          </p:nvPicPr>
+          <p:blipFill>
+            <a:blip r:embed="rId2"/>
+            <a:stretch>
+              <a:fillRect/>
+            </a:stretch>
+          </p:blipFill>
+          <p:spPr>
+            <a:xfrm>
+              <a:off x="2133716" y="806994"/>
+              <a:ext cx="3441032" cy="6882063"/>
+            </a:xfrm>
+            <a:prstGeom prst="rect">
+              <a:avLst/>
+            </a:prstGeom>
+            <a:ln>
+              <a:noFill/>
+            </a:ln>
+            <a:effectLst>
+              <a:outerShdw blurRad="292100" dist="139700" dir="2700000" algn="tl" rotWithShape="0">
+                <a:srgbClr val="333333">
+                  <a:alpha val="65000"/>
+                </a:srgbClr>
+              </a:outerShdw>
+            </a:effectLst>
+          </p:spPr>
+        </p:pic>
+        <p:cxnSp>
+          <p:nvCxnSpPr>
+            <p:cNvPr id="5" name="Straight Connector 4">
+              <a:extLst>
+                <a:ext uri="{FF2B5EF4-FFF2-40B4-BE49-F238E27FC236}">
+                  <a16:creationId xmlns:a16="http://schemas.microsoft.com/office/drawing/2014/main" id="{CDD20E64-CBF2-994A-9829-E41C7DCAD4BE}"/>
+                </a:ext>
+              </a:extLst>
+            </p:cNvPr>
+            <p:cNvCxnSpPr>
+              <a:cxnSpLocks/>
+            </p:cNvCxnSpPr>
+            <p:nvPr/>
+          </p:nvCxnSpPr>
+          <p:spPr>
+            <a:xfrm>
+              <a:off x="4195279" y="1471617"/>
+              <a:ext cx="1810666" cy="0"/>
+            </a:xfrm>
+            <a:prstGeom prst="line">
+              <a:avLst/>
+            </a:prstGeom>
+            <a:ln w="44450">
+              <a:headEnd type="oval"/>
+              <a:tailEnd type="none"/>
+            </a:ln>
+          </p:spPr>
+          <p:style>
+            <a:lnRef idx="3">
+              <a:schemeClr val="accent5"/>
+            </a:lnRef>
+            <a:fillRef idx="0">
+              <a:schemeClr val="accent5"/>
+            </a:fillRef>
+            <a:effectRef idx="2">
+              <a:schemeClr val="accent5"/>
+            </a:effectRef>
+            <a:fontRef idx="minor">
+              <a:schemeClr val="tx1"/>
+            </a:fontRef>
+          </p:style>
+        </p:cxnSp>
+        <p:cxnSp>
+          <p:nvCxnSpPr>
+            <p:cNvPr id="6" name="Straight Connector 5">
+              <a:extLst>
+                <a:ext uri="{FF2B5EF4-FFF2-40B4-BE49-F238E27FC236}">
+                  <a16:creationId xmlns:a16="http://schemas.microsoft.com/office/drawing/2014/main" id="{3073A331-9CA3-344B-9F0D-39A361A87831}"/>
+                </a:ext>
+              </a:extLst>
+            </p:cNvPr>
+            <p:cNvCxnSpPr>
+              <a:cxnSpLocks/>
+            </p:cNvCxnSpPr>
+            <p:nvPr/>
+          </p:nvCxnSpPr>
+          <p:spPr>
+            <a:xfrm>
+              <a:off x="4930797" y="1887467"/>
+              <a:ext cx="1075148" cy="0"/>
+            </a:xfrm>
+            <a:prstGeom prst="line">
+              <a:avLst/>
+            </a:prstGeom>
+            <a:ln w="44450">
+              <a:headEnd type="oval"/>
+              <a:tailEnd type="none"/>
+            </a:ln>
+          </p:spPr>
+          <p:style>
+            <a:lnRef idx="3">
+              <a:schemeClr val="accent5"/>
+            </a:lnRef>
+            <a:fillRef idx="0">
+              <a:schemeClr val="accent5"/>
+            </a:fillRef>
+            <a:effectRef idx="2">
+              <a:schemeClr val="accent5"/>
+            </a:effectRef>
+            <a:fontRef idx="minor">
+              <a:schemeClr val="tx1"/>
+            </a:fontRef>
+          </p:style>
+        </p:cxnSp>
+        <p:sp>
+          <p:nvSpPr>
+            <p:cNvPr id="7" name="TextBox 6">
+              <a:extLst>
+                <a:ext uri="{FF2B5EF4-FFF2-40B4-BE49-F238E27FC236}">
+                  <a16:creationId xmlns:a16="http://schemas.microsoft.com/office/drawing/2014/main" id="{98E54C95-A655-6A42-BAB1-F7196D77BE34}"/>
+                </a:ext>
+              </a:extLst>
+            </p:cNvPr>
+            <p:cNvSpPr txBox="1"/>
+            <p:nvPr/>
+          </p:nvSpPr>
+          <p:spPr>
+            <a:xfrm>
+              <a:off x="6005945" y="1248037"/>
+              <a:ext cx="771365" cy="488724"/>
+            </a:xfrm>
+            <a:prstGeom prst="rect">
+              <a:avLst/>
+            </a:prstGeom>
+            <a:noFill/>
+          </p:spPr>
+          <p:txBody>
+            <a:bodyPr wrap="none" rtlCol="0">
+              <a:spAutoFit/>
+            </a:bodyPr>
+            <a:lstStyle/>
+            <a:p>
+              <a:r>
+                <a:rPr lang="en-US" sz="2576" dirty="0">
+                  <a:solidFill>
+                    <a:srgbClr val="0070C0"/>
+                  </a:solidFill>
+                </a:rPr>
+                <a:t>Title</a:t>
+              </a:r>
+            </a:p>
+          </p:txBody>
+        </p:sp>
+        <p:sp>
+          <p:nvSpPr>
+            <p:cNvPr id="10" name="TextBox 9">
+              <a:extLst>
+                <a:ext uri="{FF2B5EF4-FFF2-40B4-BE49-F238E27FC236}">
+                  <a16:creationId xmlns:a16="http://schemas.microsoft.com/office/drawing/2014/main" id="{EE59D470-2ACD-BB45-9789-FE4FE804F868}"/>
+                </a:ext>
+              </a:extLst>
+            </p:cNvPr>
+            <p:cNvSpPr txBox="1"/>
+            <p:nvPr/>
+          </p:nvSpPr>
+          <p:spPr>
+            <a:xfrm>
+              <a:off x="6005944" y="1647517"/>
+              <a:ext cx="1083951" cy="488724"/>
+            </a:xfrm>
+            <a:prstGeom prst="rect">
+              <a:avLst/>
+            </a:prstGeom>
+            <a:noFill/>
+          </p:spPr>
+          <p:txBody>
+            <a:bodyPr wrap="none" rtlCol="0">
+              <a:spAutoFit/>
+            </a:bodyPr>
+            <a:lstStyle/>
+            <a:p>
+              <a:r>
+                <a:rPr lang="en-US" sz="2576" dirty="0">
+                  <a:solidFill>
+                    <a:srgbClr val="0070C0"/>
+                  </a:solidFill>
+                </a:rPr>
+                <a:t>Search</a:t>
+              </a:r>
+            </a:p>
+          </p:txBody>
+        </p:sp>
+        <p:cxnSp>
+          <p:nvCxnSpPr>
+            <p:cNvPr id="11" name="Straight Connector 10">
+              <a:extLst>
+                <a:ext uri="{FF2B5EF4-FFF2-40B4-BE49-F238E27FC236}">
+                  <a16:creationId xmlns:a16="http://schemas.microsoft.com/office/drawing/2014/main" id="{AFB60F9B-8A26-FA47-8F72-8BE2A617AA52}"/>
+                </a:ext>
+              </a:extLst>
+            </p:cNvPr>
+            <p:cNvCxnSpPr>
+              <a:cxnSpLocks/>
+            </p:cNvCxnSpPr>
+            <p:nvPr/>
+          </p:nvCxnSpPr>
+          <p:spPr>
+            <a:xfrm>
+              <a:off x="5100612" y="6871640"/>
+              <a:ext cx="1075148" cy="0"/>
+            </a:xfrm>
+            <a:prstGeom prst="line">
+              <a:avLst/>
+            </a:prstGeom>
+            <a:ln w="44450">
+              <a:headEnd type="oval"/>
+              <a:tailEnd type="none"/>
+            </a:ln>
+          </p:spPr>
+          <p:style>
+            <a:lnRef idx="3">
+              <a:schemeClr val="accent5"/>
+            </a:lnRef>
+            <a:fillRef idx="0">
+              <a:schemeClr val="accent5"/>
+            </a:fillRef>
+            <a:effectRef idx="2">
+              <a:schemeClr val="accent5"/>
+            </a:effectRef>
+            <a:fontRef idx="minor">
+              <a:schemeClr val="tx1"/>
+            </a:fontRef>
+          </p:style>
+        </p:cxnSp>
+        <p:sp>
+          <p:nvSpPr>
+            <p:cNvPr id="12" name="TextBox 11">
+              <a:extLst>
+                <a:ext uri="{FF2B5EF4-FFF2-40B4-BE49-F238E27FC236}">
+                  <a16:creationId xmlns:a16="http://schemas.microsoft.com/office/drawing/2014/main" id="{68C830D4-954F-AF4C-AB93-75CD38776293}"/>
+                </a:ext>
+              </a:extLst>
+            </p:cNvPr>
+            <p:cNvSpPr txBox="1"/>
+            <p:nvPr/>
+          </p:nvSpPr>
+          <p:spPr>
+            <a:xfrm>
+              <a:off x="6175760" y="6627278"/>
+              <a:ext cx="2182008" cy="488724"/>
+            </a:xfrm>
+            <a:prstGeom prst="rect">
+              <a:avLst/>
+            </a:prstGeom>
+            <a:noFill/>
+          </p:spPr>
+          <p:txBody>
+            <a:bodyPr wrap="none" rtlCol="0">
+              <a:spAutoFit/>
+            </a:bodyPr>
+            <a:lstStyle/>
+            <a:p>
+              <a:r>
+                <a:rPr lang="en-US" sz="2576" dirty="0">
+                  <a:solidFill>
+                    <a:srgbClr val="0070C0"/>
+                  </a:solidFill>
+                </a:rPr>
+                <a:t>Clear Selection</a:t>
+              </a:r>
+            </a:p>
+          </p:txBody>
+        </p:sp>
+        <p:cxnSp>
+          <p:nvCxnSpPr>
+            <p:cNvPr id="13" name="Straight Connector 12">
+              <a:extLst>
+                <a:ext uri="{FF2B5EF4-FFF2-40B4-BE49-F238E27FC236}">
+                  <a16:creationId xmlns:a16="http://schemas.microsoft.com/office/drawing/2014/main" id="{067603E8-7242-6842-A481-68B4C080699F}"/>
+                </a:ext>
+              </a:extLst>
+            </p:cNvPr>
+            <p:cNvCxnSpPr>
+              <a:cxnSpLocks/>
+            </p:cNvCxnSpPr>
+            <p:nvPr/>
+          </p:nvCxnSpPr>
+          <p:spPr>
+            <a:xfrm>
+              <a:off x="5037174" y="2341203"/>
+              <a:ext cx="968770" cy="0"/>
+            </a:xfrm>
+            <a:prstGeom prst="line">
+              <a:avLst/>
+            </a:prstGeom>
+            <a:ln w="44450">
+              <a:headEnd type="oval"/>
+              <a:tailEnd type="none"/>
+            </a:ln>
+          </p:spPr>
+          <p:style>
+            <a:lnRef idx="3">
+              <a:schemeClr val="accent5"/>
+            </a:lnRef>
+            <a:fillRef idx="0">
+              <a:schemeClr val="accent5"/>
+            </a:fillRef>
+            <a:effectRef idx="2">
+              <a:schemeClr val="accent5"/>
+            </a:effectRef>
+            <a:fontRef idx="minor">
+              <a:schemeClr val="tx1"/>
+            </a:fontRef>
+          </p:style>
+        </p:cxnSp>
+        <p:sp>
+          <p:nvSpPr>
+            <p:cNvPr id="15" name="TextBox 14">
+              <a:extLst>
+                <a:ext uri="{FF2B5EF4-FFF2-40B4-BE49-F238E27FC236}">
+                  <a16:creationId xmlns:a16="http://schemas.microsoft.com/office/drawing/2014/main" id="{6DBD8F74-F399-A545-B876-F35CB21142CC}"/>
+                </a:ext>
+              </a:extLst>
+            </p:cNvPr>
+            <p:cNvSpPr txBox="1"/>
+            <p:nvPr/>
+          </p:nvSpPr>
+          <p:spPr>
+            <a:xfrm>
+              <a:off x="6005943" y="2068724"/>
+              <a:ext cx="3362908" cy="704167"/>
+            </a:xfrm>
+            <a:prstGeom prst="rect">
+              <a:avLst/>
+            </a:prstGeom>
+            <a:noFill/>
+          </p:spPr>
+          <p:txBody>
+            <a:bodyPr wrap="none" rtlCol="0">
+              <a:spAutoFit/>
+            </a:bodyPr>
+            <a:lstStyle/>
+            <a:p>
+              <a:r>
+                <a:rPr lang="en-US" sz="2576" dirty="0">
+                  <a:solidFill>
+                    <a:srgbClr val="0070C0"/>
+                  </a:solidFill>
+                </a:rPr>
+                <a:t>County List</a:t>
+              </a:r>
+            </a:p>
+            <a:p>
+              <a:r>
+                <a:rPr lang="en-US" sz="1400" dirty="0">
+                  <a:solidFill>
+                    <a:srgbClr val="0070C0"/>
+                  </a:solidFill>
+                </a:rPr>
+                <a:t>Check </a:t>
+              </a:r>
+              <a:r>
+                <a:rPr lang="en-US" sz="1400" i="1" dirty="0">
+                  <a:solidFill>
+                    <a:srgbClr val="0070C0"/>
+                  </a:solidFill>
+                </a:rPr>
+                <a:t>Country List (RecyclerView) </a:t>
+              </a:r>
+              <a:r>
+                <a:rPr lang="en-US" sz="1400" dirty="0">
+                  <a:solidFill>
+                    <a:srgbClr val="0070C0"/>
+                  </a:solidFill>
+                </a:rPr>
+                <a:t>wiki page</a:t>
+              </a:r>
+            </a:p>
+          </p:txBody>
+        </p:sp>
+        <p:cxnSp>
+          <p:nvCxnSpPr>
+            <p:cNvPr id="16" name="Straight Connector 15">
+              <a:extLst>
+                <a:ext uri="{FF2B5EF4-FFF2-40B4-BE49-F238E27FC236}">
+                  <a16:creationId xmlns:a16="http://schemas.microsoft.com/office/drawing/2014/main" id="{BD58D92D-1B77-054F-9395-FDA6EAAE32EF}"/>
+                </a:ext>
+              </a:extLst>
+            </p:cNvPr>
+            <p:cNvCxnSpPr>
+              <a:cxnSpLocks/>
+            </p:cNvCxnSpPr>
+            <p:nvPr/>
+          </p:nvCxnSpPr>
+          <p:spPr>
+            <a:xfrm>
+              <a:off x="4334993" y="3512625"/>
+              <a:ext cx="1670951" cy="0"/>
+            </a:xfrm>
+            <a:prstGeom prst="line">
+              <a:avLst/>
+            </a:prstGeom>
+            <a:ln w="44450">
+              <a:headEnd type="oval"/>
+              <a:tailEnd type="none"/>
+            </a:ln>
+          </p:spPr>
+          <p:style>
+            <a:lnRef idx="3">
+              <a:schemeClr val="accent5"/>
+            </a:lnRef>
+            <a:fillRef idx="0">
+              <a:schemeClr val="accent5"/>
+            </a:fillRef>
+            <a:effectRef idx="2">
+              <a:schemeClr val="accent5"/>
+            </a:effectRef>
+            <a:fontRef idx="minor">
+              <a:schemeClr val="tx1"/>
+            </a:fontRef>
+          </p:style>
+        </p:cxnSp>
+        <p:sp>
+          <p:nvSpPr>
+            <p:cNvPr id="17" name="TextBox 16">
+              <a:extLst>
+                <a:ext uri="{FF2B5EF4-FFF2-40B4-BE49-F238E27FC236}">
+                  <a16:creationId xmlns:a16="http://schemas.microsoft.com/office/drawing/2014/main" id="{B9193FE7-0E49-814B-B763-21D022A337C6}"/>
+                </a:ext>
+              </a:extLst>
+            </p:cNvPr>
+            <p:cNvSpPr txBox="1"/>
+            <p:nvPr/>
+          </p:nvSpPr>
+          <p:spPr>
+            <a:xfrm>
+              <a:off x="6005943" y="3240146"/>
+              <a:ext cx="3080523" cy="704167"/>
+            </a:xfrm>
+            <a:prstGeom prst="rect">
+              <a:avLst/>
+            </a:prstGeom>
+            <a:noFill/>
+          </p:spPr>
+          <p:txBody>
+            <a:bodyPr wrap="square" rtlCol="0">
+              <a:spAutoFit/>
+            </a:bodyPr>
+            <a:lstStyle/>
+            <a:p>
+              <a:r>
+                <a:rPr lang="en-US" sz="2576" dirty="0">
+                  <a:solidFill>
+                    <a:srgbClr val="0070C0"/>
+                  </a:solidFill>
+                </a:rPr>
+                <a:t>County Row</a:t>
+              </a:r>
+            </a:p>
+            <a:p>
+              <a:r>
+                <a:rPr lang="en-US" sz="1400" dirty="0">
+                  <a:solidFill>
+                    <a:srgbClr val="0070C0"/>
+                  </a:solidFill>
+                </a:rPr>
+                <a:t>Check </a:t>
+              </a:r>
+              <a:r>
+                <a:rPr lang="en-US" sz="1400" i="1" dirty="0">
+                  <a:solidFill>
+                    <a:srgbClr val="0070C0"/>
+                  </a:solidFill>
+                </a:rPr>
+                <a:t>Country Row</a:t>
+              </a:r>
+              <a:r>
+                <a:rPr lang="en-US" sz="1400" dirty="0">
+                  <a:solidFill>
+                    <a:srgbClr val="0070C0"/>
+                  </a:solidFill>
+                </a:rPr>
+                <a:t> wiki page</a:t>
+              </a:r>
+            </a:p>
+          </p:txBody>
+        </p:sp>
+      </p:grpSp>
+      <p:sp>
+        <p:nvSpPr>
+          <p:cNvPr id="20" name="TextBox 19">
+            <a:extLst>
+              <a:ext uri="{FF2B5EF4-FFF2-40B4-BE49-F238E27FC236}">
+                <a16:creationId xmlns:a16="http://schemas.microsoft.com/office/drawing/2014/main" id="{242055B7-3B1A-2F4F-A4F6-A019669F6A66}"/>
+              </a:ext>
+            </a:extLst>
+          </p:cNvPr>
+          <p:cNvSpPr txBox="1"/>
+          <p:nvPr/>
+        </p:nvSpPr>
+        <p:spPr>
+          <a:xfrm>
+            <a:off x="4877321" y="469086"/>
+            <a:ext cx="5061002" cy="778098"/>
+          </a:xfrm>
+          <a:prstGeom prst="rect">
+            <a:avLst/>
+          </a:prstGeom>
+          <a:noFill/>
+        </p:spPr>
+        <p:txBody>
+          <a:bodyPr wrap="none" rtlCol="0">
+            <a:spAutoFit/>
+          </a:bodyPr>
+          <a:lstStyle/>
+          <a:p>
+            <a:pPr algn="ctr"/>
+            <a:r>
+              <a:rPr lang="en-US" sz="2814" i="1" dirty="0">
+                <a:latin typeface="Roboto" panose="02000000000000000000" pitchFamily="2" charset="0"/>
+                <a:ea typeface="Roboto" panose="02000000000000000000" pitchFamily="2" charset="0"/>
+              </a:rPr>
+              <a:t>Country Picker Dialog Anatomy</a:t>
+            </a:r>
+          </a:p>
+          <a:p>
+            <a:pPr algn="ctr"/>
+            <a:r>
+              <a:rPr lang="en-US" sz="1642" i="1" dirty="0">
+                <a:latin typeface="Roboto" panose="02000000000000000000" pitchFamily="2" charset="0"/>
+                <a:ea typeface="Roboto" panose="02000000000000000000" pitchFamily="2" charset="0"/>
+              </a:rPr>
+              <a:t>(Android Country Picker)</a:t>
+            </a:r>
+          </a:p>
+        </p:txBody>
+      </p:sp>
+    </p:spTree>
+    <p:extLst>
+      <p:ext uri="{BB962C8B-B14F-4D97-AF65-F5344CB8AC3E}">
+        <p14:creationId xmlns:p14="http://schemas.microsoft.com/office/powerpoint/2010/main" val="1717186015"/>
+      </p:ext>
+    </p:extLst>
+  </p:cSld>
+  <p:clrMapOvr>
+    <a:masterClrMapping/>
+  </p:clrMapOvr>
+</p:sld>
+</file>
+
+<file path=ppt/slides/slide11.xml><?xml version="1.0" encoding="utf-8"?>
+<p:sld xmlns:a="http://schemas.openxmlformats.org/drawingml/2006/main" xmlns:r="http://schemas.openxmlformats.org/officeDocument/2006/relationships" xmlns:p="http://schemas.openxmlformats.org/presentationml/2006/main">
+  <p:cSld>
+    <p:spTree>
+      <p:nvGrpSpPr>
+        <p:cNvPr id="1" name=""/>
+        <p:cNvGrpSpPr/>
+        <p:nvPr/>
+      </p:nvGrpSpPr>
+      <p:grpSpPr>
+        <a:xfrm>
+          <a:off x="0" y="0"/>
+          <a:ext cx="0" cy="0"/>
+          <a:chOff x="0" y="0"/>
+          <a:chExt cx="0" cy="0"/>
+        </a:xfrm>
+      </p:grpSpPr>
+      <p:sp>
+        <p:nvSpPr>
+          <p:cNvPr id="5" name="TextBox 4">
+            <a:extLst>
+              <a:ext uri="{FF2B5EF4-FFF2-40B4-BE49-F238E27FC236}">
+                <a16:creationId xmlns:a16="http://schemas.microsoft.com/office/drawing/2014/main" id="{63DF4208-CAB7-7B42-A336-4C0D9A684795}"/>
+              </a:ext>
+            </a:extLst>
+          </p:cNvPr>
+          <p:cNvSpPr txBox="1"/>
+          <p:nvPr/>
+        </p:nvSpPr>
+        <p:spPr>
+          <a:xfrm>
+            <a:off x="4757481" y="620396"/>
+            <a:ext cx="4780476" cy="778098"/>
+          </a:xfrm>
+          <a:prstGeom prst="rect">
+            <a:avLst/>
+          </a:prstGeom>
+          <a:noFill/>
+        </p:spPr>
+        <p:txBody>
+          <a:bodyPr wrap="none" rtlCol="0">
+            <a:spAutoFit/>
+          </a:bodyPr>
+          <a:lstStyle/>
+          <a:p>
+            <a:pPr algn="ctr"/>
+            <a:r>
+              <a:rPr lang="en-US" sz="2814" i="1" dirty="0">
+                <a:latin typeface="Roboto" panose="02000000000000000000" pitchFamily="2" charset="0"/>
+                <a:ea typeface="Roboto" panose="02000000000000000000" pitchFamily="2" charset="0"/>
+              </a:rPr>
+              <a:t>Default Country Picker Dialog</a:t>
+            </a:r>
+          </a:p>
+          <a:p>
+            <a:pPr algn="ctr"/>
+            <a:r>
+              <a:rPr lang="en-US" sz="1642" i="1" dirty="0">
+                <a:latin typeface="Roboto" panose="02000000000000000000" pitchFamily="2" charset="0"/>
+                <a:ea typeface="Roboto" panose="02000000000000000000" pitchFamily="2" charset="0"/>
+              </a:rPr>
+              <a:t>(Android Country Picker)</a:t>
+            </a:r>
+          </a:p>
+        </p:txBody>
+      </p:sp>
+      <p:pic>
+        <p:nvPicPr>
+          <p:cNvPr id="7" name="Picture 6" descr="A screenshot of a cell phone&#10;&#10;Description automatically generated">
+            <a:extLst>
+              <a:ext uri="{FF2B5EF4-FFF2-40B4-BE49-F238E27FC236}">
+                <a16:creationId xmlns:a16="http://schemas.microsoft.com/office/drawing/2014/main" id="{BAE4E5E5-3640-D444-8B6D-FFD84D37C215}"/>
+              </a:ext>
+            </a:extLst>
+          </p:cNvPr>
+          <p:cNvPicPr>
+            <a:picLocks noChangeAspect="1"/>
+          </p:cNvPicPr>
+          <p:nvPr/>
+        </p:nvPicPr>
+        <p:blipFill>
+          <a:blip r:embed="rId2"/>
+          <a:stretch>
+            <a:fillRect/>
+          </a:stretch>
+        </p:blipFill>
+        <p:spPr>
+          <a:xfrm>
+            <a:off x="5332286" y="1398494"/>
+            <a:ext cx="3630865" cy="7261730"/>
+          </a:xfrm>
+          <a:prstGeom prst="rect">
+            <a:avLst/>
+          </a:prstGeom>
+          <a:ln>
+            <a:noFill/>
+          </a:ln>
+          <a:effectLst>
+            <a:outerShdw blurRad="292100" dist="139700" dir="2700000" algn="tl" rotWithShape="0">
+              <a:srgbClr val="333333">
+                <a:alpha val="65000"/>
+              </a:srgbClr>
+            </a:outerShdw>
+          </a:effectLst>
+        </p:spPr>
+      </p:pic>
+    </p:spTree>
+    <p:extLst>
+      <p:ext uri="{BB962C8B-B14F-4D97-AF65-F5344CB8AC3E}">
+        <p14:creationId xmlns:p14="http://schemas.microsoft.com/office/powerpoint/2010/main" val="2503918518"/>
+      </p:ext>
+    </p:extLst>
+  </p:cSld>
+  <p:clrMapOvr>
+    <a:masterClrMapping/>
+  </p:clrMapOvr>
+</p:sld>
+</file>
+
+<file path=ppt/slides/slide12.xml><?xml version="1.0" encoding="utf-8"?>
+<p:sld xmlns:a="http://schemas.openxmlformats.org/drawingml/2006/main" xmlns:r="http://schemas.openxmlformats.org/officeDocument/2006/relationships" xmlns:p="http://schemas.openxmlformats.org/presentationml/2006/main">
+  <p:cSld>
+    <p:spTree>
+      <p:nvGrpSpPr>
+        <p:cNvPr id="1" name=""/>
+        <p:cNvGrpSpPr/>
+        <p:nvPr/>
+      </p:nvGrpSpPr>
+      <p:grpSpPr>
+        <a:xfrm>
+          <a:off x="0" y="0"/>
+          <a:ext cx="0" cy="0"/>
+          <a:chOff x="0" y="0"/>
+          <a:chExt cx="0" cy="0"/>
+        </a:xfrm>
+      </p:grpSpPr>
+      <p:pic>
+        <p:nvPicPr>
+          <p:cNvPr id="12" name="Picture 11">
+            <a:extLst>
+              <a:ext uri="{FF2B5EF4-FFF2-40B4-BE49-F238E27FC236}">
+                <a16:creationId xmlns:a16="http://schemas.microsoft.com/office/drawing/2014/main" id="{0A248191-F4F7-5F49-9061-F9474F29D7A5}"/>
+              </a:ext>
+            </a:extLst>
+          </p:cNvPr>
+          <p:cNvPicPr>
+            <a:picLocks noChangeAspect="1"/>
+          </p:cNvPicPr>
+          <p:nvPr/>
+        </p:nvPicPr>
+        <p:blipFill>
+          <a:blip r:embed="rId2"/>
+          <a:stretch>
+            <a:fillRect/>
+          </a:stretch>
+        </p:blipFill>
+        <p:spPr>
+          <a:xfrm>
+            <a:off x="2056882" y="3749053"/>
+            <a:ext cx="10999551" cy="4619147"/>
+          </a:xfrm>
+          <a:prstGeom prst="rect">
+            <a:avLst/>
+          </a:prstGeom>
+        </p:spPr>
+      </p:pic>
+      <p:grpSp>
+        <p:nvGrpSpPr>
+          <p:cNvPr id="48" name="Group 47">
+            <a:extLst>
+              <a:ext uri="{FF2B5EF4-FFF2-40B4-BE49-F238E27FC236}">
+                <a16:creationId xmlns:a16="http://schemas.microsoft.com/office/drawing/2014/main" id="{2CE76356-6923-2D4C-ABCE-42518D439A00}"/>
+              </a:ext>
+            </a:extLst>
+          </p:cNvPr>
+          <p:cNvGrpSpPr/>
+          <p:nvPr/>
+        </p:nvGrpSpPr>
+        <p:grpSpPr>
+          <a:xfrm>
+            <a:off x="210093" y="4015397"/>
+            <a:ext cx="10499854" cy="4089016"/>
+            <a:chOff x="179613" y="2176437"/>
+            <a:chExt cx="10499854" cy="4089016"/>
+          </a:xfrm>
+        </p:grpSpPr>
+        <p:sp>
+          <p:nvSpPr>
+            <p:cNvPr id="5" name="Left Brace 4">
+              <a:extLst>
+                <a:ext uri="{FF2B5EF4-FFF2-40B4-BE49-F238E27FC236}">
+                  <a16:creationId xmlns:a16="http://schemas.microsoft.com/office/drawing/2014/main" id="{EAC7DC20-7CE4-2247-AA73-BEB94E85F96C}"/>
+                </a:ext>
+              </a:extLst>
+            </p:cNvPr>
+            <p:cNvSpPr/>
+            <p:nvPr/>
+          </p:nvSpPr>
+          <p:spPr>
+            <a:xfrm>
+              <a:off x="1643605" y="2268637"/>
+              <a:ext cx="382798" cy="1076445"/>
+            </a:xfrm>
+            <a:prstGeom prst="leftBrace">
+              <a:avLst>
+                <a:gd name="adj1" fmla="val 24379"/>
+                <a:gd name="adj2" fmla="val 51124"/>
+              </a:avLst>
+            </a:prstGeom>
+            <a:ln>
+              <a:solidFill>
+                <a:srgbClr val="0070C0"/>
+              </a:solidFill>
+            </a:ln>
+          </p:spPr>
+          <p:style>
+            <a:lnRef idx="3">
+              <a:schemeClr val="accent5"/>
+            </a:lnRef>
+            <a:fillRef idx="0">
+              <a:schemeClr val="accent5"/>
+            </a:fillRef>
+            <a:effectRef idx="2">
+              <a:schemeClr val="accent5"/>
+            </a:effectRef>
+            <a:fontRef idx="minor">
+              <a:schemeClr val="tx1"/>
+            </a:fontRef>
+          </p:style>
+          <p:txBody>
+            <a:bodyPr rtlCol="0" anchor="ctr"/>
+            <a:lstStyle/>
+            <a:p>
+              <a:pPr algn="ctr"/>
+              <a:endParaRPr lang="en-US"/>
+            </a:p>
+          </p:txBody>
+        </p:sp>
+        <p:sp>
+          <p:nvSpPr>
+            <p:cNvPr id="6" name="TextBox 5">
+              <a:extLst>
+                <a:ext uri="{FF2B5EF4-FFF2-40B4-BE49-F238E27FC236}">
+                  <a16:creationId xmlns:a16="http://schemas.microsoft.com/office/drawing/2014/main" id="{980666D7-8EF5-F248-9D27-20110EF5BD87}"/>
+                </a:ext>
+              </a:extLst>
+            </p:cNvPr>
+            <p:cNvSpPr txBox="1"/>
+            <p:nvPr/>
+          </p:nvSpPr>
+          <p:spPr>
+            <a:xfrm>
+              <a:off x="181537" y="2483693"/>
+              <a:ext cx="1462067" cy="646331"/>
+            </a:xfrm>
+            <a:prstGeom prst="rect">
+              <a:avLst/>
+            </a:prstGeom>
+            <a:noFill/>
+          </p:spPr>
+          <p:txBody>
+            <a:bodyPr wrap="none" rtlCol="0">
+              <a:spAutoFit/>
+            </a:bodyPr>
+            <a:lstStyle/>
+            <a:p>
+              <a:pPr algn="r"/>
+              <a:r>
+                <a:rPr lang="en-US" dirty="0">
+                  <a:solidFill>
+                    <a:srgbClr val="0070C0"/>
+                  </a:solidFill>
+                </a:rPr>
+                <a:t>Datastore</a:t>
+              </a:r>
+            </a:p>
+            <a:p>
+              <a:pPr algn="r"/>
+              <a:r>
+                <a:rPr lang="en-US" dirty="0">
+                  <a:solidFill>
+                    <a:srgbClr val="0070C0"/>
+                  </a:solidFill>
+                </a:rPr>
+                <a:t>Configuration</a:t>
+              </a:r>
+            </a:p>
+          </p:txBody>
+        </p:sp>
+        <p:sp>
+          <p:nvSpPr>
+            <p:cNvPr id="7" name="Left Brace 6">
+              <a:extLst>
+                <a:ext uri="{FF2B5EF4-FFF2-40B4-BE49-F238E27FC236}">
+                  <a16:creationId xmlns:a16="http://schemas.microsoft.com/office/drawing/2014/main" id="{B3878193-A131-234A-8A9A-D0772DBD259D}"/>
+                </a:ext>
+              </a:extLst>
+            </p:cNvPr>
+            <p:cNvSpPr/>
+            <p:nvPr/>
+          </p:nvSpPr>
+          <p:spPr>
+            <a:xfrm>
+              <a:off x="1643605" y="3345081"/>
+              <a:ext cx="382798" cy="264159"/>
+            </a:xfrm>
+            <a:prstGeom prst="leftBrace">
+              <a:avLst>
+                <a:gd name="adj1" fmla="val 24379"/>
+                <a:gd name="adj2" fmla="val 51124"/>
+              </a:avLst>
+            </a:prstGeom>
+            <a:ln>
+              <a:solidFill>
+                <a:srgbClr val="0070C0"/>
+              </a:solidFill>
+            </a:ln>
+          </p:spPr>
+          <p:style>
+            <a:lnRef idx="3">
+              <a:schemeClr val="accent5"/>
+            </a:lnRef>
+            <a:fillRef idx="0">
+              <a:schemeClr val="accent5"/>
+            </a:fillRef>
+            <a:effectRef idx="2">
+              <a:schemeClr val="accent5"/>
+            </a:effectRef>
+            <a:fontRef idx="minor">
+              <a:schemeClr val="tx1"/>
+            </a:fontRef>
+          </p:style>
+          <p:txBody>
+            <a:bodyPr rtlCol="0" anchor="ctr"/>
+            <a:lstStyle/>
+            <a:p>
+              <a:pPr algn="ctr"/>
+              <a:endParaRPr lang="en-US"/>
+            </a:p>
+          </p:txBody>
+        </p:sp>
+        <p:sp>
+          <p:nvSpPr>
+            <p:cNvPr id="8" name="TextBox 7">
+              <a:extLst>
+                <a:ext uri="{FF2B5EF4-FFF2-40B4-BE49-F238E27FC236}">
+                  <a16:creationId xmlns:a16="http://schemas.microsoft.com/office/drawing/2014/main" id="{EA29046D-F54E-B547-874D-09194E2BF79A}"/>
+                </a:ext>
+              </a:extLst>
+            </p:cNvPr>
+            <p:cNvSpPr txBox="1"/>
+            <p:nvPr/>
+          </p:nvSpPr>
+          <p:spPr>
+            <a:xfrm>
+              <a:off x="179613" y="3169491"/>
+              <a:ext cx="1462067" cy="646331"/>
+            </a:xfrm>
+            <a:prstGeom prst="rect">
+              <a:avLst/>
+            </a:prstGeom>
+            <a:noFill/>
+          </p:spPr>
+          <p:txBody>
+            <a:bodyPr wrap="none" rtlCol="0">
+              <a:spAutoFit/>
+            </a:bodyPr>
+            <a:lstStyle/>
+            <a:p>
+              <a:pPr algn="r"/>
+              <a:r>
+                <a:rPr lang="en-US" dirty="0">
+                  <a:solidFill>
+                    <a:srgbClr val="0070C0"/>
+                  </a:solidFill>
+                </a:rPr>
+                <a:t>CPList</a:t>
+              </a:r>
+            </a:p>
+            <a:p>
+              <a:pPr algn="r"/>
+              <a:r>
+                <a:rPr lang="en-US" dirty="0">
+                  <a:solidFill>
+                    <a:srgbClr val="0070C0"/>
+                  </a:solidFill>
+                </a:rPr>
+                <a:t>Configuration</a:t>
+              </a:r>
+            </a:p>
+          </p:txBody>
+        </p:sp>
+        <p:sp>
+          <p:nvSpPr>
+            <p:cNvPr id="9" name="Left Brace 8">
+              <a:extLst>
+                <a:ext uri="{FF2B5EF4-FFF2-40B4-BE49-F238E27FC236}">
+                  <a16:creationId xmlns:a16="http://schemas.microsoft.com/office/drawing/2014/main" id="{ABFA7246-BCB2-9E44-A59A-F22DAB2D0AA7}"/>
+                </a:ext>
+              </a:extLst>
+            </p:cNvPr>
+            <p:cNvSpPr/>
+            <p:nvPr/>
+          </p:nvSpPr>
+          <p:spPr>
+            <a:xfrm>
+              <a:off x="1643605" y="3649414"/>
+              <a:ext cx="382797" cy="908048"/>
+            </a:xfrm>
+            <a:prstGeom prst="leftBrace">
+              <a:avLst>
+                <a:gd name="adj1" fmla="val 24379"/>
+                <a:gd name="adj2" fmla="val 51124"/>
+              </a:avLst>
+            </a:prstGeom>
+            <a:ln>
+              <a:solidFill>
+                <a:srgbClr val="0070C0"/>
+              </a:solidFill>
+            </a:ln>
+          </p:spPr>
+          <p:style>
+            <a:lnRef idx="3">
+              <a:schemeClr val="accent5"/>
+            </a:lnRef>
+            <a:fillRef idx="0">
+              <a:schemeClr val="accent5"/>
+            </a:fillRef>
+            <a:effectRef idx="2">
+              <a:schemeClr val="accent5"/>
+            </a:effectRef>
+            <a:fontRef idx="minor">
+              <a:schemeClr val="tx1"/>
+            </a:fontRef>
+          </p:style>
+          <p:txBody>
+            <a:bodyPr rtlCol="0" anchor="ctr"/>
+            <a:lstStyle/>
+            <a:p>
+              <a:pPr algn="ctr"/>
+              <a:endParaRPr lang="en-US"/>
+            </a:p>
+          </p:txBody>
+        </p:sp>
+        <p:sp>
+          <p:nvSpPr>
+            <p:cNvPr id="10" name="TextBox 9">
+              <a:extLst>
+                <a:ext uri="{FF2B5EF4-FFF2-40B4-BE49-F238E27FC236}">
+                  <a16:creationId xmlns:a16="http://schemas.microsoft.com/office/drawing/2014/main" id="{20FFE558-FA11-C04E-B9B8-8B15F2B63B49}"/>
+                </a:ext>
+              </a:extLst>
+            </p:cNvPr>
+            <p:cNvSpPr txBox="1"/>
+            <p:nvPr/>
+          </p:nvSpPr>
+          <p:spPr>
+            <a:xfrm>
+              <a:off x="215605" y="3815675"/>
+              <a:ext cx="1462067" cy="646331"/>
+            </a:xfrm>
+            <a:prstGeom prst="rect">
+              <a:avLst/>
+            </a:prstGeom>
+            <a:noFill/>
+          </p:spPr>
+          <p:txBody>
+            <a:bodyPr wrap="none" rtlCol="0">
+              <a:spAutoFit/>
+            </a:bodyPr>
+            <a:lstStyle/>
+            <a:p>
+              <a:pPr algn="r"/>
+              <a:r>
+                <a:rPr lang="en-US" dirty="0">
+                  <a:solidFill>
+                    <a:srgbClr val="0070C0"/>
+                  </a:solidFill>
+                </a:rPr>
+                <a:t>CPRow</a:t>
+              </a:r>
+            </a:p>
+            <a:p>
+              <a:pPr algn="r"/>
+              <a:r>
+                <a:rPr lang="en-US" dirty="0">
+                  <a:solidFill>
+                    <a:srgbClr val="0070C0"/>
+                  </a:solidFill>
+                </a:rPr>
+                <a:t>Configuration</a:t>
+              </a:r>
+            </a:p>
+          </p:txBody>
+        </p:sp>
+        <p:cxnSp>
+          <p:nvCxnSpPr>
+            <p:cNvPr id="11" name="Straight Connector 10">
+              <a:extLst>
+                <a:ext uri="{FF2B5EF4-FFF2-40B4-BE49-F238E27FC236}">
+                  <a16:creationId xmlns:a16="http://schemas.microsoft.com/office/drawing/2014/main" id="{06906B48-FF9B-9745-BA50-478D5BD805CF}"/>
+                </a:ext>
+              </a:extLst>
+            </p:cNvPr>
+            <p:cNvCxnSpPr>
+              <a:cxnSpLocks/>
+            </p:cNvCxnSpPr>
+            <p:nvPr/>
+          </p:nvCxnSpPr>
+          <p:spPr>
+            <a:xfrm>
+              <a:off x="7147719" y="2314937"/>
+              <a:ext cx="445273" cy="0"/>
+            </a:xfrm>
+            <a:prstGeom prst="line">
+              <a:avLst/>
+            </a:prstGeom>
+            <a:ln w="25400">
+              <a:solidFill>
+                <a:schemeClr val="bg1"/>
+              </a:solidFill>
+              <a:headEnd type="triangle" w="sm" len="sm"/>
+              <a:tailEnd type="none"/>
+            </a:ln>
+          </p:spPr>
+          <p:style>
+            <a:lnRef idx="3">
+              <a:schemeClr val="accent5"/>
+            </a:lnRef>
+            <a:fillRef idx="0">
+              <a:schemeClr val="accent5"/>
+            </a:fillRef>
+            <a:effectRef idx="2">
+              <a:schemeClr val="accent5"/>
+            </a:effectRef>
+            <a:fontRef idx="minor">
+              <a:schemeClr val="tx1"/>
+            </a:fontRef>
+          </p:style>
+        </p:cxnSp>
+        <p:sp>
+          <p:nvSpPr>
+            <p:cNvPr id="13" name="TextBox 12">
+              <a:extLst>
+                <a:ext uri="{FF2B5EF4-FFF2-40B4-BE49-F238E27FC236}">
+                  <a16:creationId xmlns:a16="http://schemas.microsoft.com/office/drawing/2014/main" id="{54A4FD41-02B0-0347-B2C5-743E72351C81}"/>
+                </a:ext>
+              </a:extLst>
+            </p:cNvPr>
+            <p:cNvSpPr txBox="1"/>
+            <p:nvPr/>
+          </p:nvSpPr>
+          <p:spPr>
+            <a:xfrm>
+              <a:off x="7592992" y="2176437"/>
+              <a:ext cx="2936770" cy="276999"/>
+            </a:xfrm>
+            <a:prstGeom prst="rect">
+              <a:avLst/>
+            </a:prstGeom>
+            <a:noFill/>
+          </p:spPr>
+          <p:txBody>
+            <a:bodyPr wrap="square" rtlCol="0">
+              <a:spAutoFit/>
+            </a:bodyPr>
+            <a:lstStyle/>
+            <a:p>
+              <a:r>
+                <a:rPr lang="en-US" sz="1200" dirty="0">
+                  <a:solidFill>
+                    <a:schemeClr val="bg1"/>
+                  </a:solidFill>
+                </a:rPr>
+                <a:t>Show only these countries</a:t>
+              </a:r>
+            </a:p>
+          </p:txBody>
+        </p:sp>
+        <p:cxnSp>
+          <p:nvCxnSpPr>
+            <p:cNvPr id="15" name="Straight Connector 14">
+              <a:extLst>
+                <a:ext uri="{FF2B5EF4-FFF2-40B4-BE49-F238E27FC236}">
+                  <a16:creationId xmlns:a16="http://schemas.microsoft.com/office/drawing/2014/main" id="{F3A70A3E-96D1-5F4E-836C-78E8A3465BD4}"/>
+                </a:ext>
+              </a:extLst>
+            </p:cNvPr>
+            <p:cNvCxnSpPr>
+              <a:cxnSpLocks/>
+            </p:cNvCxnSpPr>
+            <p:nvPr/>
+          </p:nvCxnSpPr>
+          <p:spPr>
+            <a:xfrm>
+              <a:off x="5679334" y="2534189"/>
+              <a:ext cx="445273" cy="0"/>
+            </a:xfrm>
+            <a:prstGeom prst="line">
+              <a:avLst/>
+            </a:prstGeom>
+            <a:ln w="25400">
+              <a:solidFill>
+                <a:schemeClr val="bg1"/>
+              </a:solidFill>
+              <a:headEnd type="triangle" w="sm" len="sm"/>
+              <a:tailEnd type="none"/>
+            </a:ln>
+          </p:spPr>
+          <p:style>
+            <a:lnRef idx="3">
+              <a:schemeClr val="accent5"/>
+            </a:lnRef>
+            <a:fillRef idx="0">
+              <a:schemeClr val="accent5"/>
+            </a:fillRef>
+            <a:effectRef idx="2">
+              <a:schemeClr val="accent5"/>
+            </a:effectRef>
+            <a:fontRef idx="minor">
+              <a:schemeClr val="tx1"/>
+            </a:fontRef>
+          </p:style>
+        </p:cxnSp>
+        <p:sp>
+          <p:nvSpPr>
+            <p:cNvPr id="16" name="TextBox 15">
+              <a:extLst>
+                <a:ext uri="{FF2B5EF4-FFF2-40B4-BE49-F238E27FC236}">
+                  <a16:creationId xmlns:a16="http://schemas.microsoft.com/office/drawing/2014/main" id="{2264036A-7517-1B43-B018-AB7C56D13B5A}"/>
+                </a:ext>
+              </a:extLst>
+            </p:cNvPr>
+            <p:cNvSpPr txBox="1"/>
+            <p:nvPr/>
+          </p:nvSpPr>
+          <p:spPr>
+            <a:xfrm>
+              <a:off x="6124607" y="2395689"/>
+              <a:ext cx="2936770" cy="276999"/>
+            </a:xfrm>
+            <a:prstGeom prst="rect">
+              <a:avLst/>
+            </a:prstGeom>
+            <a:noFill/>
+          </p:spPr>
+          <p:txBody>
+            <a:bodyPr wrap="square" rtlCol="0">
+              <a:spAutoFit/>
+            </a:bodyPr>
+            <a:lstStyle/>
+            <a:p>
+              <a:r>
+                <a:rPr lang="en-US" sz="1200" dirty="0">
+                  <a:solidFill>
+                    <a:schemeClr val="bg1"/>
+                  </a:solidFill>
+                </a:rPr>
+                <a:t>Show all countries except these</a:t>
+              </a:r>
+            </a:p>
+          </p:txBody>
+        </p:sp>
+        <p:sp>
+          <p:nvSpPr>
+            <p:cNvPr id="17" name="TextBox 16">
+              <a:extLst>
+                <a:ext uri="{FF2B5EF4-FFF2-40B4-BE49-F238E27FC236}">
+                  <a16:creationId xmlns:a16="http://schemas.microsoft.com/office/drawing/2014/main" id="{57D713D4-F3B1-2A45-AD6E-A4BACBE8B061}"/>
+                </a:ext>
+              </a:extLst>
+            </p:cNvPr>
+            <p:cNvSpPr txBox="1"/>
+            <p:nvPr/>
+          </p:nvSpPr>
+          <p:spPr>
+            <a:xfrm>
+              <a:off x="6124607" y="2662033"/>
+              <a:ext cx="2936770" cy="276999"/>
+            </a:xfrm>
+            <a:prstGeom prst="rect">
+              <a:avLst/>
+            </a:prstGeom>
+            <a:noFill/>
+          </p:spPr>
+          <p:txBody>
+            <a:bodyPr wrap="square" rtlCol="0">
+              <a:spAutoFit/>
+            </a:bodyPr>
+            <a:lstStyle/>
+            <a:p>
+              <a:r>
+                <a:rPr lang="en-US" sz="1200" dirty="0">
+                  <a:solidFill>
+                    <a:schemeClr val="bg1"/>
+                  </a:solidFill>
+                </a:rPr>
+                <a:t>Custom Country data reader</a:t>
+              </a:r>
+            </a:p>
+          </p:txBody>
+        </p:sp>
+        <p:sp>
+          <p:nvSpPr>
+            <p:cNvPr id="18" name="TextBox 17">
+              <a:extLst>
+                <a:ext uri="{FF2B5EF4-FFF2-40B4-BE49-F238E27FC236}">
+                  <a16:creationId xmlns:a16="http://schemas.microsoft.com/office/drawing/2014/main" id="{4EB42CB3-34A7-864F-A047-1BB36B506A1F}"/>
+                </a:ext>
+              </a:extLst>
+            </p:cNvPr>
+            <p:cNvSpPr txBox="1"/>
+            <p:nvPr/>
+          </p:nvSpPr>
+          <p:spPr>
+            <a:xfrm>
+              <a:off x="6124607" y="2904811"/>
+              <a:ext cx="2936770" cy="276999"/>
+            </a:xfrm>
+            <a:prstGeom prst="rect">
+              <a:avLst/>
+            </a:prstGeom>
+            <a:noFill/>
+          </p:spPr>
+          <p:txBody>
+            <a:bodyPr wrap="square" rtlCol="0">
+              <a:spAutoFit/>
+            </a:bodyPr>
+            <a:lstStyle/>
+            <a:p>
+              <a:r>
+                <a:rPr lang="en-US" sz="1200" dirty="0">
+                  <a:solidFill>
+                    <a:schemeClr val="bg1"/>
+                  </a:solidFill>
+                </a:rPr>
+                <a:t>Use cache when preparing CPDataStore</a:t>
+              </a:r>
+            </a:p>
+          </p:txBody>
+        </p:sp>
+        <p:sp>
+          <p:nvSpPr>
+            <p:cNvPr id="19" name="TextBox 18">
+              <a:extLst>
+                <a:ext uri="{FF2B5EF4-FFF2-40B4-BE49-F238E27FC236}">
+                  <a16:creationId xmlns:a16="http://schemas.microsoft.com/office/drawing/2014/main" id="{A13FDDC2-693F-9E45-B8C6-4AF03275463C}"/>
+                </a:ext>
+              </a:extLst>
+            </p:cNvPr>
+            <p:cNvSpPr txBox="1"/>
+            <p:nvPr/>
+          </p:nvSpPr>
+          <p:spPr>
+            <a:xfrm>
+              <a:off x="8657097" y="3126486"/>
+              <a:ext cx="2022370" cy="276999"/>
+            </a:xfrm>
+            <a:prstGeom prst="rect">
+              <a:avLst/>
+            </a:prstGeom>
+            <a:noFill/>
+          </p:spPr>
+          <p:txBody>
+            <a:bodyPr wrap="square" rtlCol="0">
+              <a:spAutoFit/>
+            </a:bodyPr>
+            <a:lstStyle/>
+            <a:p>
+              <a:r>
+                <a:rPr lang="en-US" sz="1200" dirty="0">
+                  <a:solidFill>
+                    <a:schemeClr val="bg1"/>
+                  </a:solidFill>
+                </a:rPr>
+                <a:t>Modify texts / country list</a:t>
+              </a:r>
+            </a:p>
+          </p:txBody>
+        </p:sp>
+        <p:cxnSp>
+          <p:nvCxnSpPr>
+            <p:cNvPr id="20" name="Straight Connector 19">
+              <a:extLst>
+                <a:ext uri="{FF2B5EF4-FFF2-40B4-BE49-F238E27FC236}">
+                  <a16:creationId xmlns:a16="http://schemas.microsoft.com/office/drawing/2014/main" id="{F374FD1A-5667-AA42-BC46-0587BE2F4565}"/>
+                </a:ext>
+              </a:extLst>
+            </p:cNvPr>
+            <p:cNvCxnSpPr>
+              <a:cxnSpLocks/>
+            </p:cNvCxnSpPr>
+            <p:nvPr/>
+          </p:nvCxnSpPr>
+          <p:spPr>
+            <a:xfrm>
+              <a:off x="5702484" y="2800532"/>
+              <a:ext cx="445273" cy="0"/>
+            </a:xfrm>
+            <a:prstGeom prst="line">
+              <a:avLst/>
+            </a:prstGeom>
+            <a:ln w="25400">
+              <a:solidFill>
+                <a:schemeClr val="bg1"/>
+              </a:solidFill>
+              <a:headEnd type="triangle" w="sm" len="sm"/>
+              <a:tailEnd type="none"/>
+            </a:ln>
+          </p:spPr>
+          <p:style>
+            <a:lnRef idx="3">
+              <a:schemeClr val="accent5"/>
+            </a:lnRef>
+            <a:fillRef idx="0">
+              <a:schemeClr val="accent5"/>
+            </a:fillRef>
+            <a:effectRef idx="2">
+              <a:schemeClr val="accent5"/>
+            </a:effectRef>
+            <a:fontRef idx="minor">
+              <a:schemeClr val="tx1"/>
+            </a:fontRef>
+          </p:style>
+        </p:cxnSp>
+        <p:cxnSp>
+          <p:nvCxnSpPr>
+            <p:cNvPr id="21" name="Straight Connector 20">
+              <a:extLst>
+                <a:ext uri="{FF2B5EF4-FFF2-40B4-BE49-F238E27FC236}">
+                  <a16:creationId xmlns:a16="http://schemas.microsoft.com/office/drawing/2014/main" id="{86BE9F72-1FC3-5E4A-A3B4-E89A7EE9DC6D}"/>
+                </a:ext>
+              </a:extLst>
+            </p:cNvPr>
+            <p:cNvCxnSpPr>
+              <a:cxnSpLocks/>
+            </p:cNvCxnSpPr>
+            <p:nvPr/>
+          </p:nvCxnSpPr>
+          <p:spPr>
+            <a:xfrm>
+              <a:off x="4166886" y="3043310"/>
+              <a:ext cx="1957720" cy="0"/>
+            </a:xfrm>
+            <a:prstGeom prst="line">
+              <a:avLst/>
+            </a:prstGeom>
+            <a:ln w="25400">
+              <a:solidFill>
+                <a:schemeClr val="bg1"/>
+              </a:solidFill>
+              <a:headEnd type="triangle" w="sm" len="sm"/>
+              <a:tailEnd type="none"/>
+            </a:ln>
+          </p:spPr>
+          <p:style>
+            <a:lnRef idx="3">
+              <a:schemeClr val="accent5"/>
+            </a:lnRef>
+            <a:fillRef idx="0">
+              <a:schemeClr val="accent5"/>
+            </a:fillRef>
+            <a:effectRef idx="2">
+              <a:schemeClr val="accent5"/>
+            </a:effectRef>
+            <a:fontRef idx="minor">
+              <a:schemeClr val="tx1"/>
+            </a:fontRef>
+          </p:style>
+        </p:cxnSp>
+        <p:cxnSp>
+          <p:nvCxnSpPr>
+            <p:cNvPr id="23" name="Straight Connector 22">
+              <a:extLst>
+                <a:ext uri="{FF2B5EF4-FFF2-40B4-BE49-F238E27FC236}">
+                  <a16:creationId xmlns:a16="http://schemas.microsoft.com/office/drawing/2014/main" id="{9A893BCA-D9FD-2841-B194-AC500AFC819B}"/>
+                </a:ext>
+              </a:extLst>
+            </p:cNvPr>
+            <p:cNvCxnSpPr>
+              <a:cxnSpLocks/>
+            </p:cNvCxnSpPr>
+            <p:nvPr/>
+          </p:nvCxnSpPr>
+          <p:spPr>
+            <a:xfrm>
+              <a:off x="8414795" y="3264985"/>
+              <a:ext cx="312516" cy="0"/>
+            </a:xfrm>
+            <a:prstGeom prst="line">
+              <a:avLst/>
+            </a:prstGeom>
+            <a:ln w="25400">
+              <a:solidFill>
+                <a:schemeClr val="bg1"/>
+              </a:solidFill>
+              <a:headEnd type="triangle" w="sm" len="sm"/>
+              <a:tailEnd type="none"/>
+            </a:ln>
+          </p:spPr>
+          <p:style>
+            <a:lnRef idx="3">
+              <a:schemeClr val="accent5"/>
+            </a:lnRef>
+            <a:fillRef idx="0">
+              <a:schemeClr val="accent5"/>
+            </a:fillRef>
+            <a:effectRef idx="2">
+              <a:schemeClr val="accent5"/>
+            </a:effectRef>
+            <a:fontRef idx="minor">
+              <a:schemeClr val="tx1"/>
+            </a:fontRef>
+          </p:style>
+        </p:cxnSp>
+        <p:sp>
+          <p:nvSpPr>
+            <p:cNvPr id="26" name="TextBox 25">
+              <a:extLst>
+                <a:ext uri="{FF2B5EF4-FFF2-40B4-BE49-F238E27FC236}">
+                  <a16:creationId xmlns:a16="http://schemas.microsoft.com/office/drawing/2014/main" id="{35373C7F-7F58-8C42-B48F-2CB16CC59FA0}"/>
+                </a:ext>
+              </a:extLst>
+            </p:cNvPr>
+            <p:cNvSpPr txBox="1"/>
+            <p:nvPr/>
+          </p:nvSpPr>
+          <p:spPr>
+            <a:xfrm>
+              <a:off x="6124605" y="3345081"/>
+              <a:ext cx="4118989" cy="276999"/>
+            </a:xfrm>
+            <a:prstGeom prst="rect">
+              <a:avLst/>
+            </a:prstGeom>
+            <a:noFill/>
+          </p:spPr>
+          <p:txBody>
+            <a:bodyPr wrap="square" rtlCol="0">
+              <a:spAutoFit/>
+            </a:bodyPr>
+            <a:lstStyle/>
+            <a:p>
+              <a:r>
+                <a:rPr lang="en-US" sz="1200" dirty="0">
+                  <a:solidFill>
+                    <a:schemeClr val="bg1"/>
+                  </a:solidFill>
+                </a:rPr>
+                <a:t> Show these countries on top of the list</a:t>
+              </a:r>
+            </a:p>
+          </p:txBody>
+        </p:sp>
+        <p:cxnSp>
+          <p:nvCxnSpPr>
+            <p:cNvPr id="27" name="Straight Connector 26">
+              <a:extLst>
+                <a:ext uri="{FF2B5EF4-FFF2-40B4-BE49-F238E27FC236}">
+                  <a16:creationId xmlns:a16="http://schemas.microsoft.com/office/drawing/2014/main" id="{978E8E1B-E3DA-F749-BDFE-4A1A978F1E18}"/>
+                </a:ext>
+              </a:extLst>
+            </p:cNvPr>
+            <p:cNvCxnSpPr>
+              <a:cxnSpLocks/>
+            </p:cNvCxnSpPr>
+            <p:nvPr/>
+          </p:nvCxnSpPr>
+          <p:spPr>
+            <a:xfrm flipV="1">
+              <a:off x="5428527" y="3483580"/>
+              <a:ext cx="766293" cy="12840"/>
+            </a:xfrm>
+            <a:prstGeom prst="line">
+              <a:avLst/>
+            </a:prstGeom>
+            <a:ln w="25400">
+              <a:solidFill>
+                <a:schemeClr val="bg1"/>
+              </a:solidFill>
+              <a:headEnd type="triangle" w="sm" len="sm"/>
+              <a:tailEnd type="none"/>
+            </a:ln>
+          </p:spPr>
+          <p:style>
+            <a:lnRef idx="3">
+              <a:schemeClr val="accent5"/>
+            </a:lnRef>
+            <a:fillRef idx="0">
+              <a:schemeClr val="accent5"/>
+            </a:fillRef>
+            <a:effectRef idx="2">
+              <a:schemeClr val="accent5"/>
+            </a:effectRef>
+            <a:fontRef idx="minor">
+              <a:schemeClr val="tx1"/>
+            </a:fontRef>
+          </p:style>
+        </p:cxnSp>
+        <p:sp>
+          <p:nvSpPr>
+            <p:cNvPr id="32" name="TextBox 31">
+              <a:extLst>
+                <a:ext uri="{FF2B5EF4-FFF2-40B4-BE49-F238E27FC236}">
+                  <a16:creationId xmlns:a16="http://schemas.microsoft.com/office/drawing/2014/main" id="{1CD0273F-4E8A-5748-AD17-6F511FCA8BE7}"/>
+                </a:ext>
+              </a:extLst>
+            </p:cNvPr>
+            <p:cNvSpPr txBox="1"/>
+            <p:nvPr/>
+          </p:nvSpPr>
+          <p:spPr>
+            <a:xfrm>
+              <a:off x="7053394" y="3553344"/>
+              <a:ext cx="3382043" cy="276999"/>
+            </a:xfrm>
+            <a:prstGeom prst="rect">
+              <a:avLst/>
+            </a:prstGeom>
+            <a:noFill/>
+          </p:spPr>
+          <p:txBody>
+            <a:bodyPr wrap="square" rtlCol="0">
+              <a:spAutoFit/>
+            </a:bodyPr>
+            <a:lstStyle/>
+            <a:p>
+              <a:r>
+                <a:rPr lang="en-US" sz="1200" dirty="0">
+                  <a:solidFill>
+                    <a:schemeClr val="bg1"/>
+                  </a:solidFill>
+                </a:rPr>
+                <a:t>Custom Flag Image Provider</a:t>
+              </a:r>
+            </a:p>
+          </p:txBody>
+        </p:sp>
+        <p:cxnSp>
+          <p:nvCxnSpPr>
+            <p:cNvPr id="33" name="Straight Connector 32">
+              <a:extLst>
+                <a:ext uri="{FF2B5EF4-FFF2-40B4-BE49-F238E27FC236}">
+                  <a16:creationId xmlns:a16="http://schemas.microsoft.com/office/drawing/2014/main" id="{E707F3A5-F86D-334F-9735-B1CE74B8F748}"/>
+                </a:ext>
+              </a:extLst>
+            </p:cNvPr>
+            <p:cNvCxnSpPr>
+              <a:cxnSpLocks/>
+              <a:endCxn id="32" idx="1"/>
+            </p:cNvCxnSpPr>
+            <p:nvPr/>
+          </p:nvCxnSpPr>
+          <p:spPr>
+            <a:xfrm flipV="1">
+              <a:off x="5213450" y="3691844"/>
+              <a:ext cx="1839944" cy="47732"/>
+            </a:xfrm>
+            <a:prstGeom prst="line">
+              <a:avLst/>
+            </a:prstGeom>
+            <a:ln w="25400">
+              <a:solidFill>
+                <a:schemeClr val="bg1"/>
+              </a:solidFill>
+              <a:headEnd type="triangle" w="sm" len="sm"/>
+              <a:tailEnd type="none"/>
+            </a:ln>
+          </p:spPr>
+          <p:style>
+            <a:lnRef idx="3">
+              <a:schemeClr val="accent5"/>
+            </a:lnRef>
+            <a:fillRef idx="0">
+              <a:schemeClr val="accent5"/>
+            </a:fillRef>
+            <a:effectRef idx="2">
+              <a:schemeClr val="accent5"/>
+            </a:effectRef>
+            <a:fontRef idx="minor">
+              <a:schemeClr val="tx1"/>
+            </a:fontRef>
+          </p:style>
+        </p:cxnSp>
+        <p:sp>
+          <p:nvSpPr>
+            <p:cNvPr id="34" name="TextBox 33">
+              <a:extLst>
+                <a:ext uri="{FF2B5EF4-FFF2-40B4-BE49-F238E27FC236}">
+                  <a16:creationId xmlns:a16="http://schemas.microsoft.com/office/drawing/2014/main" id="{53DEB1C7-E09B-E248-8757-088199FCEEDB}"/>
+                </a:ext>
+              </a:extLst>
+            </p:cNvPr>
+            <p:cNvSpPr txBox="1"/>
+            <p:nvPr/>
+          </p:nvSpPr>
+          <p:spPr>
+            <a:xfrm>
+              <a:off x="7496742" y="3821982"/>
+              <a:ext cx="2085024" cy="276999"/>
+            </a:xfrm>
+            <a:prstGeom prst="rect">
+              <a:avLst/>
+            </a:prstGeom>
+            <a:noFill/>
+          </p:spPr>
+          <p:txBody>
+            <a:bodyPr wrap="square" rtlCol="0">
+              <a:spAutoFit/>
+            </a:bodyPr>
+            <a:lstStyle/>
+            <a:p>
+              <a:r>
+                <a:rPr lang="en-US" sz="1200" dirty="0">
+                  <a:solidFill>
+                    <a:schemeClr val="bg1"/>
+                  </a:solidFill>
+                </a:rPr>
+                <a:t>Main text of country row</a:t>
+              </a:r>
+            </a:p>
+          </p:txBody>
+        </p:sp>
+        <p:cxnSp>
+          <p:nvCxnSpPr>
+            <p:cNvPr id="35" name="Straight Connector 34">
+              <a:extLst>
+                <a:ext uri="{FF2B5EF4-FFF2-40B4-BE49-F238E27FC236}">
+                  <a16:creationId xmlns:a16="http://schemas.microsoft.com/office/drawing/2014/main" id="{A4078623-976A-324C-A776-A87BA8906F96}"/>
+                </a:ext>
+              </a:extLst>
+            </p:cNvPr>
+            <p:cNvCxnSpPr>
+              <a:cxnSpLocks/>
+            </p:cNvCxnSpPr>
+            <p:nvPr/>
+          </p:nvCxnSpPr>
+          <p:spPr>
+            <a:xfrm>
+              <a:off x="7123174" y="3951121"/>
+              <a:ext cx="387896" cy="59"/>
+            </a:xfrm>
+            <a:prstGeom prst="line">
+              <a:avLst/>
+            </a:prstGeom>
+            <a:ln w="25400">
+              <a:solidFill>
+                <a:schemeClr val="bg1"/>
+              </a:solidFill>
+              <a:headEnd type="triangle" w="sm" len="sm"/>
+              <a:tailEnd type="none"/>
+            </a:ln>
+          </p:spPr>
+          <p:style>
+            <a:lnRef idx="3">
+              <a:schemeClr val="accent5"/>
+            </a:lnRef>
+            <a:fillRef idx="0">
+              <a:schemeClr val="accent5"/>
+            </a:fillRef>
+            <a:effectRef idx="2">
+              <a:schemeClr val="accent5"/>
+            </a:effectRef>
+            <a:fontRef idx="minor">
+              <a:schemeClr val="tx1"/>
+            </a:fontRef>
+          </p:style>
+        </p:cxnSp>
+        <p:sp>
+          <p:nvSpPr>
+            <p:cNvPr id="37" name="TextBox 36">
+              <a:extLst>
+                <a:ext uri="{FF2B5EF4-FFF2-40B4-BE49-F238E27FC236}">
+                  <a16:creationId xmlns:a16="http://schemas.microsoft.com/office/drawing/2014/main" id="{6D6F2CFB-5899-7D48-8DB5-9AC14A253BB4}"/>
+                </a:ext>
+              </a:extLst>
+            </p:cNvPr>
+            <p:cNvSpPr txBox="1"/>
+            <p:nvPr/>
+          </p:nvSpPr>
+          <p:spPr>
+            <a:xfrm>
+              <a:off x="8830012" y="4055407"/>
+              <a:ext cx="1568776" cy="276999"/>
+            </a:xfrm>
+            <a:prstGeom prst="rect">
+              <a:avLst/>
+            </a:prstGeom>
+            <a:noFill/>
+          </p:spPr>
+          <p:txBody>
+            <a:bodyPr wrap="square" rtlCol="0">
+              <a:spAutoFit/>
+            </a:bodyPr>
+            <a:lstStyle/>
+            <a:p>
+              <a:r>
+                <a:rPr lang="en-US" sz="1200" dirty="0">
+                  <a:solidFill>
+                    <a:schemeClr val="bg1"/>
+                  </a:solidFill>
+                </a:rPr>
+                <a:t>Text below main text</a:t>
+              </a:r>
+            </a:p>
+          </p:txBody>
+        </p:sp>
+        <p:cxnSp>
+          <p:nvCxnSpPr>
+            <p:cNvPr id="38" name="Straight Connector 37">
+              <a:extLst>
+                <a:ext uri="{FF2B5EF4-FFF2-40B4-BE49-F238E27FC236}">
+                  <a16:creationId xmlns:a16="http://schemas.microsoft.com/office/drawing/2014/main" id="{AB8F772F-F073-CE42-B81F-BE8A983A6D0B}"/>
+                </a:ext>
+              </a:extLst>
+            </p:cNvPr>
+            <p:cNvCxnSpPr>
+              <a:cxnSpLocks/>
+            </p:cNvCxnSpPr>
+            <p:nvPr/>
+          </p:nvCxnSpPr>
+          <p:spPr>
+            <a:xfrm>
+              <a:off x="8591559" y="4172971"/>
+              <a:ext cx="273177" cy="59"/>
+            </a:xfrm>
+            <a:prstGeom prst="line">
+              <a:avLst/>
+            </a:prstGeom>
+            <a:ln w="25400">
+              <a:solidFill>
+                <a:schemeClr val="bg1"/>
+              </a:solidFill>
+              <a:headEnd type="triangle" w="sm" len="sm"/>
+              <a:tailEnd type="none"/>
+            </a:ln>
+          </p:spPr>
+          <p:style>
+            <a:lnRef idx="3">
+              <a:schemeClr val="accent5"/>
+            </a:lnRef>
+            <a:fillRef idx="0">
+              <a:schemeClr val="accent5"/>
+            </a:fillRef>
+            <a:effectRef idx="2">
+              <a:schemeClr val="accent5"/>
+            </a:effectRef>
+            <a:fontRef idx="minor">
+              <a:schemeClr val="tx1"/>
+            </a:fontRef>
+          </p:style>
+        </p:cxnSp>
+        <p:sp>
+          <p:nvSpPr>
+            <p:cNvPr id="40" name="TextBox 39">
+              <a:extLst>
+                <a:ext uri="{FF2B5EF4-FFF2-40B4-BE49-F238E27FC236}">
+                  <a16:creationId xmlns:a16="http://schemas.microsoft.com/office/drawing/2014/main" id="{BFC3643C-7227-C647-9DC9-F12647AFBD6F}"/>
+                </a:ext>
+              </a:extLst>
+            </p:cNvPr>
+            <p:cNvSpPr txBox="1"/>
+            <p:nvPr/>
+          </p:nvSpPr>
+          <p:spPr>
+            <a:xfrm>
+              <a:off x="7846672" y="4310672"/>
+              <a:ext cx="2552115" cy="277000"/>
+            </a:xfrm>
+            <a:prstGeom prst="rect">
+              <a:avLst/>
+            </a:prstGeom>
+            <a:noFill/>
+          </p:spPr>
+          <p:txBody>
+            <a:bodyPr wrap="square" rtlCol="0">
+              <a:spAutoFit/>
+            </a:bodyPr>
+            <a:lstStyle/>
+            <a:p>
+              <a:r>
+                <a:rPr lang="en-US" sz="1200" dirty="0">
+                  <a:solidFill>
+                    <a:schemeClr val="bg1"/>
+                  </a:solidFill>
+                </a:rPr>
+                <a:t>Text towards end of the country row</a:t>
+              </a:r>
+            </a:p>
+          </p:txBody>
+        </p:sp>
+        <p:cxnSp>
+          <p:nvCxnSpPr>
+            <p:cNvPr id="41" name="Straight Connector 40">
+              <a:extLst>
+                <a:ext uri="{FF2B5EF4-FFF2-40B4-BE49-F238E27FC236}">
+                  <a16:creationId xmlns:a16="http://schemas.microsoft.com/office/drawing/2014/main" id="{043C227E-CE22-CD45-B39D-5F5BF60A2202}"/>
+                </a:ext>
+              </a:extLst>
+            </p:cNvPr>
+            <p:cNvCxnSpPr>
+              <a:cxnSpLocks/>
+            </p:cNvCxnSpPr>
+            <p:nvPr/>
+          </p:nvCxnSpPr>
+          <p:spPr>
+            <a:xfrm>
+              <a:off x="7608220" y="4428236"/>
+              <a:ext cx="273177" cy="59"/>
+            </a:xfrm>
+            <a:prstGeom prst="line">
+              <a:avLst/>
+            </a:prstGeom>
+            <a:ln w="25400">
+              <a:solidFill>
+                <a:schemeClr val="bg1"/>
+              </a:solidFill>
+              <a:headEnd type="triangle" w="sm" len="sm"/>
+              <a:tailEnd type="none"/>
+            </a:ln>
+          </p:spPr>
+          <p:style>
+            <a:lnRef idx="3">
+              <a:schemeClr val="accent5"/>
+            </a:lnRef>
+            <a:fillRef idx="0">
+              <a:schemeClr val="accent5"/>
+            </a:fillRef>
+            <a:effectRef idx="2">
+              <a:schemeClr val="accent5"/>
+            </a:effectRef>
+            <a:fontRef idx="minor">
+              <a:schemeClr val="tx1"/>
+            </a:fontRef>
+          </p:style>
+        </p:cxnSp>
+        <p:sp>
+          <p:nvSpPr>
+            <p:cNvPr id="42" name="TextBox 41">
+              <a:extLst>
+                <a:ext uri="{FF2B5EF4-FFF2-40B4-BE49-F238E27FC236}">
+                  <a16:creationId xmlns:a16="http://schemas.microsoft.com/office/drawing/2014/main" id="{249654EA-43EF-4346-AA58-92B50DA847C7}"/>
+                </a:ext>
+              </a:extLst>
+            </p:cNvPr>
+            <p:cNvSpPr txBox="1"/>
+            <p:nvPr/>
+          </p:nvSpPr>
+          <p:spPr>
+            <a:xfrm>
+              <a:off x="7955751" y="5988453"/>
+              <a:ext cx="2552115" cy="277000"/>
+            </a:xfrm>
+            <a:prstGeom prst="rect">
+              <a:avLst/>
+            </a:prstGeom>
+            <a:noFill/>
+          </p:spPr>
+          <p:txBody>
+            <a:bodyPr wrap="square" rtlCol="0">
+              <a:spAutoFit/>
+            </a:bodyPr>
+            <a:lstStyle/>
+            <a:p>
+              <a:r>
+                <a:rPr lang="en-US" sz="1200" dirty="0">
+                  <a:solidFill>
+                    <a:schemeClr val="bg1"/>
+                  </a:solidFill>
+                </a:rPr>
+                <a:t>Handle selected country</a:t>
+              </a:r>
+            </a:p>
+          </p:txBody>
+        </p:sp>
+        <p:cxnSp>
+          <p:nvCxnSpPr>
+            <p:cNvPr id="43" name="Straight Connector 42">
+              <a:extLst>
+                <a:ext uri="{FF2B5EF4-FFF2-40B4-BE49-F238E27FC236}">
+                  <a16:creationId xmlns:a16="http://schemas.microsoft.com/office/drawing/2014/main" id="{EC9A64EB-15DA-5945-B65B-F4C0F6BFAA5D}"/>
+                </a:ext>
+              </a:extLst>
+            </p:cNvPr>
+            <p:cNvCxnSpPr>
+              <a:cxnSpLocks/>
+            </p:cNvCxnSpPr>
+            <p:nvPr/>
+          </p:nvCxnSpPr>
+          <p:spPr>
+            <a:xfrm>
+              <a:off x="6207649" y="6106076"/>
+              <a:ext cx="1782827" cy="0"/>
+            </a:xfrm>
+            <a:prstGeom prst="line">
+              <a:avLst/>
+            </a:prstGeom>
+            <a:ln w="25400">
+              <a:solidFill>
+                <a:schemeClr val="bg1"/>
+              </a:solidFill>
+              <a:headEnd type="triangle" w="sm" len="sm"/>
+              <a:tailEnd type="none"/>
+            </a:ln>
+          </p:spPr>
+          <p:style>
+            <a:lnRef idx="3">
+              <a:schemeClr val="accent5"/>
+            </a:lnRef>
+            <a:fillRef idx="0">
+              <a:schemeClr val="accent5"/>
+            </a:fillRef>
+            <a:effectRef idx="2">
+              <a:schemeClr val="accent5"/>
+            </a:effectRef>
+            <a:fontRef idx="minor">
+              <a:schemeClr val="tx1"/>
+            </a:fontRef>
+          </p:style>
+        </p:cxnSp>
+      </p:grpSp>
+      <p:sp>
+        <p:nvSpPr>
+          <p:cNvPr id="47" name="TextBox 46">
+            <a:extLst>
+              <a:ext uri="{FF2B5EF4-FFF2-40B4-BE49-F238E27FC236}">
+                <a16:creationId xmlns:a16="http://schemas.microsoft.com/office/drawing/2014/main" id="{70E3F56D-FE4D-7E4E-9694-1D6528B22864}"/>
+              </a:ext>
+            </a:extLst>
+          </p:cNvPr>
+          <p:cNvSpPr txBox="1"/>
+          <p:nvPr/>
+        </p:nvSpPr>
+        <p:spPr>
+          <a:xfrm>
+            <a:off x="3152345" y="870236"/>
+            <a:ext cx="4722768" cy="778098"/>
+          </a:xfrm>
+          <a:prstGeom prst="rect">
+            <a:avLst/>
+          </a:prstGeom>
+          <a:noFill/>
+        </p:spPr>
+        <p:txBody>
+          <a:bodyPr wrap="none" rtlCol="0">
+            <a:spAutoFit/>
+          </a:bodyPr>
+          <a:lstStyle/>
+          <a:p>
+            <a:r>
+              <a:rPr lang="en-US" sz="2814" i="1" dirty="0">
+                <a:latin typeface="Roboto" panose="02000000000000000000" pitchFamily="2" charset="0"/>
+                <a:ea typeface="Roboto" panose="02000000000000000000" pitchFamily="2" charset="0"/>
+              </a:rPr>
+              <a:t>CP Dialog extension function</a:t>
+            </a:r>
+          </a:p>
+          <a:p>
+            <a:pPr algn="ctr"/>
+            <a:r>
+              <a:rPr lang="en-US" sz="1642" i="1" dirty="0">
+                <a:latin typeface="Roboto" panose="02000000000000000000" pitchFamily="2" charset="0"/>
+                <a:ea typeface="Roboto" panose="02000000000000000000" pitchFamily="2" charset="0"/>
+              </a:rPr>
+              <a:t>(Android Country Picker)</a:t>
+            </a:r>
+          </a:p>
+        </p:txBody>
+      </p:sp>
+      <p:sp>
+        <p:nvSpPr>
+          <p:cNvPr id="50" name="TextBox 49">
+            <a:extLst>
+              <a:ext uri="{FF2B5EF4-FFF2-40B4-BE49-F238E27FC236}">
+                <a16:creationId xmlns:a16="http://schemas.microsoft.com/office/drawing/2014/main" id="{2251A7B4-135C-9F4E-9410-38C111A2CFF8}"/>
+              </a:ext>
+            </a:extLst>
+          </p:cNvPr>
+          <p:cNvSpPr txBox="1"/>
+          <p:nvPr/>
+        </p:nvSpPr>
+        <p:spPr>
+          <a:xfrm>
+            <a:off x="1969416" y="3088389"/>
+            <a:ext cx="490840" cy="369332"/>
+          </a:xfrm>
+          <a:prstGeom prst="rect">
+            <a:avLst/>
+          </a:prstGeom>
+          <a:noFill/>
+        </p:spPr>
+        <p:txBody>
+          <a:bodyPr wrap="none" rtlCol="0">
+            <a:spAutoFit/>
+          </a:bodyPr>
+          <a:lstStyle/>
+          <a:p>
+            <a:r>
+              <a:rPr lang="en-US" b="1" dirty="0">
+                <a:solidFill>
+                  <a:srgbClr val="0070C0"/>
+                </a:solidFill>
+                <a:latin typeface="Roboto" panose="02000000000000000000" pitchFamily="2" charset="0"/>
+                <a:ea typeface="Roboto" panose="02000000000000000000" pitchFamily="2" charset="0"/>
+              </a:rPr>
+              <a:t>OR</a:t>
+            </a:r>
+          </a:p>
+        </p:txBody>
+      </p:sp>
+      <p:sp>
+        <p:nvSpPr>
+          <p:cNvPr id="51" name="Pentagon 50">
+            <a:extLst>
+              <a:ext uri="{FF2B5EF4-FFF2-40B4-BE49-F238E27FC236}">
+                <a16:creationId xmlns:a16="http://schemas.microsoft.com/office/drawing/2014/main" id="{9ACC639C-58E9-F94F-A0E8-574A0FD26C4A}"/>
+              </a:ext>
+            </a:extLst>
+          </p:cNvPr>
+          <p:cNvSpPr/>
+          <p:nvPr/>
+        </p:nvSpPr>
+        <p:spPr>
+          <a:xfrm>
+            <a:off x="2056882" y="3452327"/>
+            <a:ext cx="3214914" cy="296726"/>
+          </a:xfrm>
+          <a:prstGeom prst="homePlate">
+            <a:avLst/>
+          </a:prstGeom>
+          <a:solidFill>
+            <a:srgbClr val="0070C0"/>
+          </a:solidFill>
+          <a:ln>
+            <a:noFill/>
+          </a:ln>
+        </p:spPr>
+        <p:style>
+          <a:lnRef idx="2">
+            <a:schemeClr val="accent1">
+              <a:shade val="50000"/>
+            </a:schemeClr>
+          </a:lnRef>
+          <a:fillRef idx="1">
+            <a:schemeClr val="accent1"/>
+          </a:fillRef>
+          <a:effectRef idx="0">
+            <a:schemeClr val="accent1"/>
+          </a:effectRef>
+          <a:fontRef idx="minor">
+            <a:schemeClr val="lt1"/>
+          </a:fontRef>
+        </p:style>
+        <p:txBody>
+          <a:bodyPr rtlCol="0" anchor="ctr"/>
+          <a:lstStyle/>
+          <a:p>
+            <a:pPr algn="ctr"/>
+            <a:r>
+              <a:rPr lang="en-US" dirty="0">
+                <a:solidFill>
+                  <a:schemeClr val="bg1"/>
+                </a:solidFill>
+              </a:rPr>
+              <a:t>Available configuration options</a:t>
+            </a:r>
+          </a:p>
+        </p:txBody>
+      </p:sp>
+      <p:sp>
+        <p:nvSpPr>
+          <p:cNvPr id="52" name="Pentagon 51">
+            <a:extLst>
+              <a:ext uri="{FF2B5EF4-FFF2-40B4-BE49-F238E27FC236}">
+                <a16:creationId xmlns:a16="http://schemas.microsoft.com/office/drawing/2014/main" id="{E91FE359-1114-1D4C-9614-B32179425A91}"/>
+              </a:ext>
+            </a:extLst>
+          </p:cNvPr>
+          <p:cNvSpPr/>
+          <p:nvPr/>
+        </p:nvSpPr>
+        <p:spPr>
+          <a:xfrm>
+            <a:off x="2056882" y="1710800"/>
+            <a:ext cx="1095463" cy="296726"/>
+          </a:xfrm>
+          <a:prstGeom prst="homePlate">
+            <a:avLst/>
+          </a:prstGeom>
+          <a:solidFill>
+            <a:srgbClr val="0070C0"/>
+          </a:solidFill>
+          <a:ln>
+            <a:noFill/>
+          </a:ln>
+        </p:spPr>
+        <p:style>
+          <a:lnRef idx="2">
+            <a:schemeClr val="accent1">
+              <a:shade val="50000"/>
+            </a:schemeClr>
+          </a:lnRef>
+          <a:fillRef idx="1">
+            <a:schemeClr val="accent1"/>
+          </a:fillRef>
+          <a:effectRef idx="0">
+            <a:schemeClr val="accent1"/>
+          </a:effectRef>
+          <a:fontRef idx="minor">
+            <a:schemeClr val="lt1"/>
+          </a:fontRef>
+        </p:style>
+        <p:txBody>
+          <a:bodyPr rtlCol="0" anchor="ctr"/>
+          <a:lstStyle/>
+          <a:p>
+            <a:pPr algn="ctr"/>
+            <a:r>
+              <a:rPr lang="en-US" dirty="0">
+                <a:solidFill>
+                  <a:schemeClr val="bg1"/>
+                </a:solidFill>
+              </a:rPr>
+              <a:t>Default</a:t>
+            </a:r>
+          </a:p>
+        </p:txBody>
+      </p:sp>
+      <p:pic>
+        <p:nvPicPr>
+          <p:cNvPr id="2" name="Picture 1">
+            <a:extLst>
+              <a:ext uri="{FF2B5EF4-FFF2-40B4-BE49-F238E27FC236}">
+                <a16:creationId xmlns:a16="http://schemas.microsoft.com/office/drawing/2014/main" id="{D1EF718E-160C-C847-8121-9BA6E09B1B27}"/>
+              </a:ext>
+            </a:extLst>
+          </p:cNvPr>
+          <p:cNvPicPr>
+            <a:picLocks noChangeAspect="1"/>
+          </p:cNvPicPr>
+          <p:nvPr/>
+        </p:nvPicPr>
+        <p:blipFill rotWithShape="1">
+          <a:blip r:embed="rId3"/>
+          <a:srcRect b="18211"/>
+          <a:stretch/>
+        </p:blipFill>
+        <p:spPr>
+          <a:xfrm>
+            <a:off x="2056882" y="2010464"/>
+            <a:ext cx="7505700" cy="997174"/>
+          </a:xfrm>
+          <a:prstGeom prst="rect">
+            <a:avLst/>
+          </a:prstGeom>
+        </p:spPr>
+      </p:pic>
+      <p:sp>
+        <p:nvSpPr>
+          <p:cNvPr id="44" name="Left Brace 43">
+            <a:extLst>
+              <a:ext uri="{FF2B5EF4-FFF2-40B4-BE49-F238E27FC236}">
+                <a16:creationId xmlns:a16="http://schemas.microsoft.com/office/drawing/2014/main" id="{602A0A81-6021-DD46-B184-0FF7D54C0404}"/>
+              </a:ext>
+            </a:extLst>
+          </p:cNvPr>
+          <p:cNvSpPr/>
+          <p:nvPr/>
+        </p:nvSpPr>
+        <p:spPr>
+          <a:xfrm>
+            <a:off x="1672160" y="6418866"/>
+            <a:ext cx="382797" cy="1095714"/>
+          </a:xfrm>
+          <a:prstGeom prst="leftBrace">
+            <a:avLst>
+              <a:gd name="adj1" fmla="val 24379"/>
+              <a:gd name="adj2" fmla="val 51124"/>
+            </a:avLst>
+          </a:prstGeom>
+          <a:ln>
+            <a:solidFill>
+              <a:srgbClr val="0070C0"/>
+            </a:solidFill>
+          </a:ln>
+        </p:spPr>
+        <p:style>
+          <a:lnRef idx="3">
+            <a:schemeClr val="accent5"/>
+          </a:lnRef>
+          <a:fillRef idx="0">
+            <a:schemeClr val="accent5"/>
+          </a:fillRef>
+          <a:effectRef idx="2">
+            <a:schemeClr val="accent5"/>
+          </a:effectRef>
+          <a:fontRef idx="minor">
+            <a:schemeClr val="tx1"/>
+          </a:fontRef>
+        </p:style>
+        <p:txBody>
+          <a:bodyPr rtlCol="0" anchor="ctr"/>
+          <a:lstStyle/>
+          <a:p>
+            <a:pPr algn="ctr"/>
+            <a:endParaRPr lang="en-US"/>
+          </a:p>
+        </p:txBody>
+      </p:sp>
+      <p:sp>
+        <p:nvSpPr>
+          <p:cNvPr id="45" name="TextBox 44">
+            <a:extLst>
+              <a:ext uri="{FF2B5EF4-FFF2-40B4-BE49-F238E27FC236}">
+                <a16:creationId xmlns:a16="http://schemas.microsoft.com/office/drawing/2014/main" id="{896D123D-0A7A-584B-899E-F7899EDD4C8F}"/>
+              </a:ext>
+            </a:extLst>
+          </p:cNvPr>
+          <p:cNvSpPr txBox="1"/>
+          <p:nvPr/>
+        </p:nvSpPr>
+        <p:spPr>
+          <a:xfrm>
+            <a:off x="246085" y="6623984"/>
+            <a:ext cx="1462067" cy="646331"/>
+          </a:xfrm>
+          <a:prstGeom prst="rect">
+            <a:avLst/>
+          </a:prstGeom>
+          <a:noFill/>
+        </p:spPr>
+        <p:txBody>
+          <a:bodyPr wrap="none" rtlCol="0">
+            <a:spAutoFit/>
+          </a:bodyPr>
+          <a:lstStyle/>
+          <a:p>
+            <a:pPr algn="r"/>
+            <a:r>
+              <a:rPr lang="en-US" dirty="0">
+                <a:solidFill>
+                  <a:srgbClr val="0070C0"/>
+                </a:solidFill>
+              </a:rPr>
+              <a:t>CPDialog</a:t>
+            </a:r>
+          </a:p>
+          <a:p>
+            <a:pPr algn="r"/>
+            <a:r>
+              <a:rPr lang="en-US" dirty="0">
+                <a:solidFill>
+                  <a:srgbClr val="0070C0"/>
+                </a:solidFill>
+              </a:rPr>
+              <a:t>Configuration</a:t>
+            </a:r>
+          </a:p>
+        </p:txBody>
+      </p:sp>
+      <p:sp>
+        <p:nvSpPr>
+          <p:cNvPr id="46" name="TextBox 45">
+            <a:extLst>
+              <a:ext uri="{FF2B5EF4-FFF2-40B4-BE49-F238E27FC236}">
+                <a16:creationId xmlns:a16="http://schemas.microsoft.com/office/drawing/2014/main" id="{2E0690CC-B26B-C242-8E42-7748C8AC2351}"/>
+              </a:ext>
+            </a:extLst>
+          </p:cNvPr>
+          <p:cNvSpPr txBox="1"/>
+          <p:nvPr/>
+        </p:nvSpPr>
+        <p:spPr>
+          <a:xfrm>
+            <a:off x="6062277" y="6381896"/>
+            <a:ext cx="2552115" cy="277000"/>
+          </a:xfrm>
+          <a:prstGeom prst="rect">
+            <a:avLst/>
+          </a:prstGeom>
+          <a:noFill/>
+        </p:spPr>
+        <p:txBody>
+          <a:bodyPr wrap="square" rtlCol="0">
+            <a:spAutoFit/>
+          </a:bodyPr>
+          <a:lstStyle/>
+          <a:p>
+            <a:r>
+              <a:rPr lang="en-US" sz="1200" dirty="0">
+                <a:solidFill>
+                  <a:schemeClr val="bg1"/>
+                </a:solidFill>
+              </a:rPr>
+              <a:t>Use custom view for dialog</a:t>
+            </a:r>
+          </a:p>
+        </p:txBody>
+      </p:sp>
+      <p:cxnSp>
+        <p:nvCxnSpPr>
+          <p:cNvPr id="53" name="Straight Connector 52">
+            <a:extLst>
+              <a:ext uri="{FF2B5EF4-FFF2-40B4-BE49-F238E27FC236}">
+                <a16:creationId xmlns:a16="http://schemas.microsoft.com/office/drawing/2014/main" id="{29A127B1-3658-7F4F-BE96-3F39000EBD2A}"/>
+              </a:ext>
+            </a:extLst>
+          </p:cNvPr>
+          <p:cNvCxnSpPr>
+            <a:cxnSpLocks/>
+          </p:cNvCxnSpPr>
+          <p:nvPr/>
+        </p:nvCxnSpPr>
+        <p:spPr>
+          <a:xfrm>
+            <a:off x="5823825" y="6499460"/>
+            <a:ext cx="273177" cy="59"/>
+          </a:xfrm>
+          <a:prstGeom prst="line">
+            <a:avLst/>
+          </a:prstGeom>
+          <a:ln w="25400">
+            <a:solidFill>
+              <a:schemeClr val="bg1"/>
+            </a:solidFill>
+            <a:headEnd type="triangle" w="sm" len="sm"/>
+            <a:tailEnd type="none"/>
+          </a:ln>
+        </p:spPr>
+        <p:style>
+          <a:lnRef idx="3">
+            <a:schemeClr val="accent5"/>
+          </a:lnRef>
+          <a:fillRef idx="0">
+            <a:schemeClr val="accent5"/>
+          </a:fillRef>
+          <a:effectRef idx="2">
+            <a:schemeClr val="accent5"/>
+          </a:effectRef>
+          <a:fontRef idx="minor">
+            <a:schemeClr val="tx1"/>
+          </a:fontRef>
+        </p:style>
+      </p:cxnSp>
+      <p:sp>
+        <p:nvSpPr>
+          <p:cNvPr id="54" name="TextBox 53">
+            <a:extLst>
+              <a:ext uri="{FF2B5EF4-FFF2-40B4-BE49-F238E27FC236}">
+                <a16:creationId xmlns:a16="http://schemas.microsoft.com/office/drawing/2014/main" id="{CB5C5BF7-7062-974C-BBEF-6639ADE9D0E0}"/>
+              </a:ext>
+            </a:extLst>
+          </p:cNvPr>
+          <p:cNvSpPr txBox="1"/>
+          <p:nvPr/>
+        </p:nvSpPr>
+        <p:spPr>
+          <a:xfrm>
+            <a:off x="6062277" y="6585980"/>
+            <a:ext cx="2552115" cy="277000"/>
+          </a:xfrm>
+          <a:prstGeom prst="rect">
+            <a:avLst/>
+          </a:prstGeom>
+          <a:noFill/>
+        </p:spPr>
+        <p:txBody>
+          <a:bodyPr wrap="square" rtlCol="0">
+            <a:spAutoFit/>
+          </a:bodyPr>
+          <a:lstStyle/>
+          <a:p>
+            <a:r>
+              <a:rPr lang="en-US" sz="1200" dirty="0">
+                <a:solidFill>
+                  <a:schemeClr val="bg1"/>
+                </a:solidFill>
+              </a:rPr>
+              <a:t>Enable / disable search</a:t>
+            </a:r>
+          </a:p>
+        </p:txBody>
+      </p:sp>
+      <p:cxnSp>
+        <p:nvCxnSpPr>
+          <p:cNvPr id="55" name="Straight Connector 54">
+            <a:extLst>
+              <a:ext uri="{FF2B5EF4-FFF2-40B4-BE49-F238E27FC236}">
+                <a16:creationId xmlns:a16="http://schemas.microsoft.com/office/drawing/2014/main" id="{AA40C878-7663-C54C-966D-3844605B58E1}"/>
+              </a:ext>
+            </a:extLst>
+          </p:cNvPr>
+          <p:cNvCxnSpPr>
+            <a:cxnSpLocks/>
+          </p:cNvCxnSpPr>
+          <p:nvPr/>
+        </p:nvCxnSpPr>
+        <p:spPr>
+          <a:xfrm>
+            <a:off x="4424516" y="6725725"/>
+            <a:ext cx="1672486" cy="0"/>
+          </a:xfrm>
+          <a:prstGeom prst="line">
+            <a:avLst/>
+          </a:prstGeom>
+          <a:ln w="25400">
+            <a:solidFill>
+              <a:schemeClr val="bg1"/>
+            </a:solidFill>
+            <a:headEnd type="triangle" w="sm" len="sm"/>
+            <a:tailEnd type="none"/>
+          </a:ln>
+        </p:spPr>
+        <p:style>
+          <a:lnRef idx="3">
+            <a:schemeClr val="accent5"/>
+          </a:lnRef>
+          <a:fillRef idx="0">
+            <a:schemeClr val="accent5"/>
+          </a:fillRef>
+          <a:effectRef idx="2">
+            <a:schemeClr val="accent5"/>
+          </a:effectRef>
+          <a:fontRef idx="minor">
+            <a:schemeClr val="tx1"/>
+          </a:fontRef>
+        </p:style>
+      </p:cxnSp>
+      <p:sp>
+        <p:nvSpPr>
+          <p:cNvPr id="56" name="TextBox 55">
+            <a:extLst>
+              <a:ext uri="{FF2B5EF4-FFF2-40B4-BE49-F238E27FC236}">
+                <a16:creationId xmlns:a16="http://schemas.microsoft.com/office/drawing/2014/main" id="{13E79E7B-DEBF-6A48-B133-6066787E65B7}"/>
+              </a:ext>
+            </a:extLst>
+          </p:cNvPr>
+          <p:cNvSpPr txBox="1"/>
+          <p:nvPr/>
+        </p:nvSpPr>
+        <p:spPr>
+          <a:xfrm>
+            <a:off x="6049418" y="6850022"/>
+            <a:ext cx="3513164" cy="276999"/>
+          </a:xfrm>
+          <a:prstGeom prst="rect">
+            <a:avLst/>
+          </a:prstGeom>
+          <a:noFill/>
+        </p:spPr>
+        <p:txBody>
+          <a:bodyPr wrap="square" rtlCol="0">
+            <a:spAutoFit/>
+          </a:bodyPr>
+          <a:lstStyle/>
+          <a:p>
+            <a:r>
+              <a:rPr lang="en-US" sz="1200" dirty="0">
+                <a:solidFill>
+                  <a:schemeClr val="bg1"/>
+                </a:solidFill>
+              </a:rPr>
+              <a:t>Allow to clear selection (returns </a:t>
+            </a:r>
+            <a:r>
+              <a:rPr lang="en-US" sz="1200" i="1" dirty="0">
+                <a:solidFill>
+                  <a:schemeClr val="bg1"/>
+                </a:solidFill>
+              </a:rPr>
+              <a:t>null when cleared)</a:t>
+            </a:r>
+          </a:p>
+        </p:txBody>
+      </p:sp>
+      <p:cxnSp>
+        <p:nvCxnSpPr>
+          <p:cNvPr id="57" name="Straight Connector 56">
+            <a:extLst>
+              <a:ext uri="{FF2B5EF4-FFF2-40B4-BE49-F238E27FC236}">
+                <a16:creationId xmlns:a16="http://schemas.microsoft.com/office/drawing/2014/main" id="{3EEA9BCF-2AB9-4B4D-BBB9-A8941A9FFE1B}"/>
+              </a:ext>
+            </a:extLst>
+          </p:cNvPr>
+          <p:cNvCxnSpPr>
+            <a:cxnSpLocks/>
+          </p:cNvCxnSpPr>
+          <p:nvPr/>
+        </p:nvCxnSpPr>
+        <p:spPr>
+          <a:xfrm>
+            <a:off x="4987582" y="6988522"/>
+            <a:ext cx="1074695" cy="0"/>
+          </a:xfrm>
+          <a:prstGeom prst="line">
+            <a:avLst/>
+          </a:prstGeom>
+          <a:ln w="25400">
+            <a:solidFill>
+              <a:schemeClr val="bg1"/>
+            </a:solidFill>
+            <a:headEnd type="triangle" w="sm" len="sm"/>
+            <a:tailEnd type="none"/>
+          </a:ln>
+        </p:spPr>
+        <p:style>
+          <a:lnRef idx="3">
+            <a:schemeClr val="accent5"/>
+          </a:lnRef>
+          <a:fillRef idx="0">
+            <a:schemeClr val="accent5"/>
+          </a:fillRef>
+          <a:effectRef idx="2">
+            <a:schemeClr val="accent5"/>
+          </a:effectRef>
+          <a:fontRef idx="minor">
+            <a:schemeClr val="tx1"/>
+          </a:fontRef>
+        </p:style>
+      </p:cxnSp>
+      <p:sp>
+        <p:nvSpPr>
+          <p:cNvPr id="58" name="TextBox 57">
+            <a:extLst>
+              <a:ext uri="{FF2B5EF4-FFF2-40B4-BE49-F238E27FC236}">
+                <a16:creationId xmlns:a16="http://schemas.microsoft.com/office/drawing/2014/main" id="{A5474D77-08A4-5541-B6DF-C5704079D4F0}"/>
+              </a:ext>
+            </a:extLst>
+          </p:cNvPr>
+          <p:cNvSpPr txBox="1"/>
+          <p:nvPr/>
+        </p:nvSpPr>
+        <p:spPr>
+          <a:xfrm>
+            <a:off x="6062277" y="7082903"/>
+            <a:ext cx="3513164" cy="276999"/>
+          </a:xfrm>
+          <a:prstGeom prst="rect">
+            <a:avLst/>
+          </a:prstGeom>
+          <a:noFill/>
+        </p:spPr>
+        <p:txBody>
+          <a:bodyPr wrap="square" rtlCol="0">
+            <a:spAutoFit/>
+          </a:bodyPr>
+          <a:lstStyle/>
+          <a:p>
+            <a:r>
+              <a:rPr lang="en-US" sz="1200" i="1" dirty="0">
+                <a:solidFill>
+                  <a:schemeClr val="bg1"/>
+                </a:solidFill>
+              </a:rPr>
+              <a:t>Show / hide title</a:t>
+            </a:r>
+          </a:p>
+        </p:txBody>
+      </p:sp>
+      <p:cxnSp>
+        <p:nvCxnSpPr>
+          <p:cNvPr id="59" name="Straight Connector 58">
+            <a:extLst>
+              <a:ext uri="{FF2B5EF4-FFF2-40B4-BE49-F238E27FC236}">
+                <a16:creationId xmlns:a16="http://schemas.microsoft.com/office/drawing/2014/main" id="{E046D7EF-0EE5-F84F-B241-796BFD2397AA}"/>
+              </a:ext>
+            </a:extLst>
+          </p:cNvPr>
+          <p:cNvCxnSpPr>
+            <a:cxnSpLocks/>
+          </p:cNvCxnSpPr>
+          <p:nvPr/>
+        </p:nvCxnSpPr>
+        <p:spPr>
+          <a:xfrm flipV="1">
+            <a:off x="4197366" y="7221403"/>
+            <a:ext cx="1877770" cy="13180"/>
+          </a:xfrm>
+          <a:prstGeom prst="line">
+            <a:avLst/>
+          </a:prstGeom>
+          <a:ln w="25400">
+            <a:solidFill>
+              <a:schemeClr val="bg1"/>
+            </a:solidFill>
+            <a:headEnd type="triangle" w="sm" len="sm"/>
+            <a:tailEnd type="none"/>
+          </a:ln>
+        </p:spPr>
+        <p:style>
+          <a:lnRef idx="3">
+            <a:schemeClr val="accent5"/>
+          </a:lnRef>
+          <a:fillRef idx="0">
+            <a:schemeClr val="accent5"/>
+          </a:fillRef>
+          <a:effectRef idx="2">
+            <a:schemeClr val="accent5"/>
+          </a:effectRef>
+          <a:fontRef idx="minor">
+            <a:schemeClr val="tx1"/>
+          </a:fontRef>
+        </p:style>
+      </p:cxnSp>
+      <p:sp>
+        <p:nvSpPr>
+          <p:cNvPr id="60" name="TextBox 59">
+            <a:extLst>
+              <a:ext uri="{FF2B5EF4-FFF2-40B4-BE49-F238E27FC236}">
+                <a16:creationId xmlns:a16="http://schemas.microsoft.com/office/drawing/2014/main" id="{4A8F3C06-1E91-DF4B-B400-CC01EBAB0AE7}"/>
+              </a:ext>
+            </a:extLst>
+          </p:cNvPr>
+          <p:cNvSpPr txBox="1"/>
+          <p:nvPr/>
+        </p:nvSpPr>
+        <p:spPr>
+          <a:xfrm>
+            <a:off x="6056755" y="7295148"/>
+            <a:ext cx="3513164" cy="276999"/>
+          </a:xfrm>
+          <a:prstGeom prst="rect">
+            <a:avLst/>
+          </a:prstGeom>
+          <a:noFill/>
+        </p:spPr>
+        <p:txBody>
+          <a:bodyPr wrap="square" rtlCol="0">
+            <a:spAutoFit/>
+          </a:bodyPr>
+          <a:lstStyle/>
+          <a:p>
+            <a:r>
+              <a:rPr lang="en-US" sz="1200" i="1" dirty="0">
+                <a:solidFill>
+                  <a:schemeClr val="bg1"/>
+                </a:solidFill>
+              </a:rPr>
+              <a:t>Switch between Full screen dialog and Regular Dialog</a:t>
+            </a:r>
+          </a:p>
+        </p:txBody>
+      </p:sp>
+      <p:cxnSp>
+        <p:nvCxnSpPr>
+          <p:cNvPr id="61" name="Straight Connector 60">
+            <a:extLst>
+              <a:ext uri="{FF2B5EF4-FFF2-40B4-BE49-F238E27FC236}">
+                <a16:creationId xmlns:a16="http://schemas.microsoft.com/office/drawing/2014/main" id="{8C3B674F-CB76-BC40-BCE0-75F2A59559CD}"/>
+              </a:ext>
+            </a:extLst>
+          </p:cNvPr>
+          <p:cNvCxnSpPr>
+            <a:cxnSpLocks/>
+          </p:cNvCxnSpPr>
+          <p:nvPr/>
+        </p:nvCxnSpPr>
+        <p:spPr>
+          <a:xfrm flipV="1">
+            <a:off x="4435106" y="7420443"/>
+            <a:ext cx="1614312" cy="11123"/>
+          </a:xfrm>
+          <a:prstGeom prst="line">
+            <a:avLst/>
+          </a:prstGeom>
+          <a:ln w="25400">
+            <a:solidFill>
+              <a:schemeClr val="bg1"/>
+            </a:solidFill>
+            <a:headEnd type="triangle" w="sm" len="sm"/>
+            <a:tailEnd type="none"/>
+          </a:ln>
+        </p:spPr>
+        <p:style>
+          <a:lnRef idx="3">
+            <a:schemeClr val="accent5"/>
+          </a:lnRef>
+          <a:fillRef idx="0">
+            <a:schemeClr val="accent5"/>
+          </a:fillRef>
+          <a:effectRef idx="2">
+            <a:schemeClr val="accent5"/>
+          </a:effectRef>
+          <a:fontRef idx="minor">
+            <a:schemeClr val="tx1"/>
+          </a:fontRef>
+        </p:style>
+      </p:cxnSp>
+      <p:pic>
+        <p:nvPicPr>
+          <p:cNvPr id="31" name="Picture 30">
+            <a:extLst>
+              <a:ext uri="{FF2B5EF4-FFF2-40B4-BE49-F238E27FC236}">
+                <a16:creationId xmlns:a16="http://schemas.microsoft.com/office/drawing/2014/main" id="{FEE9EB9C-7C3D-544C-840A-7C0EA217BBDD}"/>
+              </a:ext>
+            </a:extLst>
+          </p:cNvPr>
+          <p:cNvPicPr>
+            <a:picLocks noChangeAspect="1"/>
+          </p:cNvPicPr>
+          <p:nvPr/>
+        </p:nvPicPr>
+        <p:blipFill>
+          <a:blip r:embed="rId4"/>
+          <a:stretch>
+            <a:fillRect/>
+          </a:stretch>
+        </p:blipFill>
+        <p:spPr>
+          <a:xfrm>
+            <a:off x="9262287" y="2010200"/>
+            <a:ext cx="3794146" cy="997174"/>
+          </a:xfrm>
+          <a:prstGeom prst="rect">
+            <a:avLst/>
+          </a:prstGeom>
+        </p:spPr>
+      </p:pic>
+    </p:spTree>
+    <p:extLst>
+      <p:ext uri="{BB962C8B-B14F-4D97-AF65-F5344CB8AC3E}">
+        <p14:creationId xmlns:p14="http://schemas.microsoft.com/office/powerpoint/2010/main" val="1237566631"/>
+      </p:ext>
+    </p:extLst>
+  </p:cSld>
+  <p:clrMapOvr>
+    <a:masterClrMapping/>
+  </p:clrMapOvr>
+</p:sld>
+</file>
+
+<file path=ppt/slides/slide13.xml><?xml version="1.0" encoding="utf-8"?>
+<p:sld xmlns:a="http://schemas.openxmlformats.org/drawingml/2006/main" xmlns:r="http://schemas.openxmlformats.org/officeDocument/2006/relationships" xmlns:p="http://schemas.openxmlformats.org/presentationml/2006/main">
+  <p:cSld>
+    <p:spTree>
+      <p:nvGrpSpPr>
+        <p:cNvPr id="1" name=""/>
+        <p:cNvGrpSpPr/>
+        <p:nvPr/>
+      </p:nvGrpSpPr>
+      <p:grpSpPr>
+        <a:xfrm>
+          <a:off x="0" y="0"/>
+          <a:ext cx="0" cy="0"/>
+          <a:chOff x="0" y="0"/>
+          <a:chExt cx="0" cy="0"/>
+        </a:xfrm>
+      </p:grpSpPr>
+      <p:sp>
+        <p:nvSpPr>
+          <p:cNvPr id="7" name="TextBox 6">
+            <a:extLst>
+              <a:ext uri="{FF2B5EF4-FFF2-40B4-BE49-F238E27FC236}">
+                <a16:creationId xmlns:a16="http://schemas.microsoft.com/office/drawing/2014/main" id="{56C8E178-D543-D046-8007-4AD23B655C4C}"/>
+              </a:ext>
+            </a:extLst>
+          </p:cNvPr>
+          <p:cNvSpPr txBox="1"/>
+          <p:nvPr/>
+        </p:nvSpPr>
+        <p:spPr>
+          <a:xfrm>
+            <a:off x="4218537" y="412429"/>
+            <a:ext cx="2834430" cy="778098"/>
+          </a:xfrm>
+          <a:prstGeom prst="rect">
+            <a:avLst/>
+          </a:prstGeom>
+          <a:noFill/>
+        </p:spPr>
+        <p:txBody>
+          <a:bodyPr wrap="none" rtlCol="0">
+            <a:spAutoFit/>
+          </a:bodyPr>
+          <a:lstStyle/>
+          <a:p>
+            <a:pPr algn="ctr"/>
+            <a:r>
+              <a:rPr lang="en-US" sz="2814" i="1" dirty="0">
+                <a:latin typeface="Roboto" panose="02000000000000000000" pitchFamily="2" charset="0"/>
+                <a:ea typeface="Roboto" panose="02000000000000000000" pitchFamily="2" charset="0"/>
+              </a:rPr>
+              <a:t>CP Dialogs Sizes</a:t>
+            </a:r>
+          </a:p>
+          <a:p>
+            <a:pPr algn="ctr"/>
+            <a:r>
+              <a:rPr lang="en-US" sz="1642" i="1" dirty="0">
+                <a:latin typeface="Roboto" panose="02000000000000000000" pitchFamily="2" charset="0"/>
+                <a:ea typeface="Roboto" panose="02000000000000000000" pitchFamily="2" charset="0"/>
+              </a:rPr>
+              <a:t>(Android Country Picker)</a:t>
+            </a:r>
+          </a:p>
+        </p:txBody>
+      </p:sp>
+      <p:pic>
+        <p:nvPicPr>
+          <p:cNvPr id="9" name="Picture 8" descr="A screenshot of a cell phone&#10;&#10;Description automatically generated">
+            <a:extLst>
+              <a:ext uri="{FF2B5EF4-FFF2-40B4-BE49-F238E27FC236}">
+                <a16:creationId xmlns:a16="http://schemas.microsoft.com/office/drawing/2014/main" id="{6F180E3D-F455-7841-8692-D2626212B549}"/>
+              </a:ext>
+            </a:extLst>
+          </p:cNvPr>
+          <p:cNvPicPr>
+            <a:picLocks noChangeAspect="1"/>
+          </p:cNvPicPr>
+          <p:nvPr/>
+        </p:nvPicPr>
+        <p:blipFill>
+          <a:blip r:embed="rId2"/>
+          <a:stretch>
+            <a:fillRect/>
+          </a:stretch>
+        </p:blipFill>
+        <p:spPr>
+          <a:xfrm>
+            <a:off x="1962454" y="1559859"/>
+            <a:ext cx="3417360" cy="6834720"/>
+          </a:xfrm>
+          <a:prstGeom prst="rect">
+            <a:avLst/>
+          </a:prstGeom>
+          <a:ln>
+            <a:noFill/>
+          </a:ln>
+          <a:effectLst>
+            <a:outerShdw blurRad="292100" dist="139700" dir="2700000" algn="tl" rotWithShape="0">
+              <a:srgbClr val="333333">
+                <a:alpha val="65000"/>
+              </a:srgbClr>
+            </a:outerShdw>
+          </a:effectLst>
+        </p:spPr>
+      </p:pic>
+      <p:pic>
+        <p:nvPicPr>
+          <p:cNvPr id="11" name="Picture 10" descr="A screenshot of a cell phone&#10;&#10;Description automatically generated">
+            <a:extLst>
+              <a:ext uri="{FF2B5EF4-FFF2-40B4-BE49-F238E27FC236}">
+                <a16:creationId xmlns:a16="http://schemas.microsoft.com/office/drawing/2014/main" id="{DEB9224E-CC76-B84F-97B1-52004A9D7D8C}"/>
+              </a:ext>
+            </a:extLst>
+          </p:cNvPr>
+          <p:cNvPicPr>
+            <a:picLocks noChangeAspect="1"/>
+          </p:cNvPicPr>
+          <p:nvPr/>
+        </p:nvPicPr>
+        <p:blipFill>
+          <a:blip r:embed="rId3"/>
+          <a:stretch>
+            <a:fillRect/>
+          </a:stretch>
+        </p:blipFill>
+        <p:spPr>
+          <a:xfrm>
+            <a:off x="5857407" y="1559859"/>
+            <a:ext cx="3417361" cy="6834720"/>
+          </a:xfrm>
+          <a:prstGeom prst="rect">
+            <a:avLst/>
+          </a:prstGeom>
+          <a:ln>
+            <a:noFill/>
+          </a:ln>
+          <a:effectLst>
+            <a:outerShdw blurRad="292100" dist="139700" dir="2700000" algn="tl" rotWithShape="0">
+              <a:srgbClr val="333333">
+                <a:alpha val="65000"/>
+              </a:srgbClr>
+            </a:outerShdw>
+          </a:effectLst>
+        </p:spPr>
+      </p:pic>
+      <p:sp>
+        <p:nvSpPr>
+          <p:cNvPr id="12" name="Rectangle 11">
+            <a:extLst>
+              <a:ext uri="{FF2B5EF4-FFF2-40B4-BE49-F238E27FC236}">
+                <a16:creationId xmlns:a16="http://schemas.microsoft.com/office/drawing/2014/main" id="{E34EFCF8-34AB-4343-A646-78C75BC3082A}"/>
+              </a:ext>
+            </a:extLst>
+          </p:cNvPr>
+          <p:cNvSpPr/>
+          <p:nvPr/>
+        </p:nvSpPr>
+        <p:spPr>
+          <a:xfrm>
+            <a:off x="2487161" y="1190527"/>
+            <a:ext cx="2367956" cy="369332"/>
+          </a:xfrm>
+          <a:prstGeom prst="rect">
+            <a:avLst/>
+          </a:prstGeom>
+        </p:spPr>
+        <p:txBody>
+          <a:bodyPr wrap="none">
+            <a:spAutoFit/>
+          </a:bodyPr>
+          <a:lstStyle/>
+          <a:p>
+            <a:pPr algn="ctr"/>
+            <a:r>
+              <a:rPr lang="en-US" i="1" dirty="0">
+                <a:latin typeface="Roboto" panose="02000000000000000000" pitchFamily="2" charset="0"/>
+                <a:ea typeface="Roboto" panose="02000000000000000000" pitchFamily="2" charset="0"/>
+              </a:rPr>
+              <a:t>Regular Size (Default)</a:t>
+            </a:r>
+          </a:p>
+        </p:txBody>
+      </p:sp>
+      <p:sp>
+        <p:nvSpPr>
+          <p:cNvPr id="13" name="Rectangle 12">
+            <a:extLst>
+              <a:ext uri="{FF2B5EF4-FFF2-40B4-BE49-F238E27FC236}">
+                <a16:creationId xmlns:a16="http://schemas.microsoft.com/office/drawing/2014/main" id="{36B2847C-46F3-B047-8461-8788B4D26AB1}"/>
+              </a:ext>
+            </a:extLst>
+          </p:cNvPr>
+          <p:cNvSpPr/>
+          <p:nvPr/>
+        </p:nvSpPr>
+        <p:spPr>
+          <a:xfrm>
+            <a:off x="7052967" y="1190527"/>
+            <a:ext cx="1026243" cy="369332"/>
+          </a:xfrm>
+          <a:prstGeom prst="rect">
+            <a:avLst/>
+          </a:prstGeom>
+        </p:spPr>
+        <p:txBody>
+          <a:bodyPr wrap="none">
+            <a:spAutoFit/>
+          </a:bodyPr>
+          <a:lstStyle/>
+          <a:p>
+            <a:pPr algn="ctr"/>
+            <a:r>
+              <a:rPr lang="en-US" i="1" dirty="0">
+                <a:latin typeface="Roboto" panose="02000000000000000000" pitchFamily="2" charset="0"/>
+                <a:ea typeface="Roboto" panose="02000000000000000000" pitchFamily="2" charset="0"/>
+              </a:rPr>
+              <a:t>Full Size</a:t>
+            </a:r>
+          </a:p>
+        </p:txBody>
+      </p:sp>
+    </p:spTree>
+    <p:extLst>
+      <p:ext uri="{BB962C8B-B14F-4D97-AF65-F5344CB8AC3E}">
+        <p14:creationId xmlns:p14="http://schemas.microsoft.com/office/powerpoint/2010/main" val="121141469"/>
       </p:ext>
     </p:extLst>
   </p:cSld>
@@ -7773,6 +10873,205 @@
 </p:sld>
 </file>
 
+<file path=ppt/slides/slide9.xml><?xml version="1.0" encoding="utf-8"?>
+<p:sld xmlns:a="http://schemas.openxmlformats.org/drawingml/2006/main" xmlns:r="http://schemas.openxmlformats.org/officeDocument/2006/relationships" xmlns:p="http://schemas.openxmlformats.org/presentationml/2006/main">
+  <p:cSld>
+    <p:spTree>
+      <p:nvGrpSpPr>
+        <p:cNvPr id="1" name=""/>
+        <p:cNvGrpSpPr/>
+        <p:nvPr/>
+      </p:nvGrpSpPr>
+      <p:grpSpPr>
+        <a:xfrm>
+          <a:off x="0" y="0"/>
+          <a:ext cx="0" cy="0"/>
+          <a:chOff x="0" y="0"/>
+          <a:chExt cx="0" cy="0"/>
+        </a:xfrm>
+      </p:grpSpPr>
+      <p:pic>
+        <p:nvPicPr>
+          <p:cNvPr id="5" name="Picture 4" descr="A screenshot of a cell phone&#10;&#10;Description automatically generated">
+            <a:extLst>
+              <a:ext uri="{FF2B5EF4-FFF2-40B4-BE49-F238E27FC236}">
+                <a16:creationId xmlns:a16="http://schemas.microsoft.com/office/drawing/2014/main" id="{7ED04115-DC47-B24E-AB25-8088BD5C66AF}"/>
+              </a:ext>
+            </a:extLst>
+          </p:cNvPr>
+          <p:cNvPicPr>
+            <a:picLocks noChangeAspect="1"/>
+          </p:cNvPicPr>
+          <p:nvPr/>
+        </p:nvPicPr>
+        <p:blipFill>
+          <a:blip r:embed="rId2"/>
+          <a:stretch>
+            <a:fillRect/>
+          </a:stretch>
+        </p:blipFill>
+        <p:spPr>
+          <a:xfrm>
+            <a:off x="543907" y="1378494"/>
+            <a:ext cx="3441032" cy="6882063"/>
+          </a:xfrm>
+          <a:prstGeom prst="rect">
+            <a:avLst/>
+          </a:prstGeom>
+          <a:ln>
+            <a:noFill/>
+          </a:ln>
+          <a:effectLst>
+            <a:outerShdw blurRad="292100" dist="139700" dir="2700000" algn="tl" rotWithShape="0">
+              <a:srgbClr val="333333">
+                <a:alpha val="65000"/>
+              </a:srgbClr>
+            </a:outerShdw>
+          </a:effectLst>
+        </p:spPr>
+      </p:pic>
+      <p:pic>
+        <p:nvPicPr>
+          <p:cNvPr id="15" name="Picture 14" descr="A screenshot of a cell phone&#10;&#10;Description automatically generated">
+            <a:extLst>
+              <a:ext uri="{FF2B5EF4-FFF2-40B4-BE49-F238E27FC236}">
+                <a16:creationId xmlns:a16="http://schemas.microsoft.com/office/drawing/2014/main" id="{7C0606B9-3104-2140-A531-6F31BB0B44D5}"/>
+              </a:ext>
+            </a:extLst>
+          </p:cNvPr>
+          <p:cNvPicPr>
+            <a:picLocks noChangeAspect="1"/>
+          </p:cNvPicPr>
+          <p:nvPr/>
+        </p:nvPicPr>
+        <p:blipFill>
+          <a:blip r:embed="rId3"/>
+          <a:stretch>
+            <a:fillRect/>
+          </a:stretch>
+        </p:blipFill>
+        <p:spPr>
+          <a:xfrm>
+            <a:off x="4463915" y="1378493"/>
+            <a:ext cx="3441032" cy="6882063"/>
+          </a:xfrm>
+          <a:prstGeom prst="rect">
+            <a:avLst/>
+          </a:prstGeom>
+          <a:ln>
+            <a:noFill/>
+          </a:ln>
+          <a:effectLst>
+            <a:outerShdw blurRad="292100" dist="139700" dir="2700000" algn="tl" rotWithShape="0">
+              <a:srgbClr val="333333">
+                <a:alpha val="65000"/>
+              </a:srgbClr>
+            </a:outerShdw>
+          </a:effectLst>
+        </p:spPr>
+      </p:pic>
+      <p:pic>
+        <p:nvPicPr>
+          <p:cNvPr id="17" name="Picture 16" descr="A screenshot of a cell phone&#10;&#10;Description automatically generated">
+            <a:extLst>
+              <a:ext uri="{FF2B5EF4-FFF2-40B4-BE49-F238E27FC236}">
+                <a16:creationId xmlns:a16="http://schemas.microsoft.com/office/drawing/2014/main" id="{B5143B3C-0099-6D4D-8BE7-AC49EEDD20FE}"/>
+              </a:ext>
+            </a:extLst>
+          </p:cNvPr>
+          <p:cNvPicPr>
+            <a:picLocks noChangeAspect="1"/>
+          </p:cNvPicPr>
+          <p:nvPr/>
+        </p:nvPicPr>
+        <p:blipFill>
+          <a:blip r:embed="rId4"/>
+          <a:stretch>
+            <a:fillRect/>
+          </a:stretch>
+        </p:blipFill>
+        <p:spPr>
+          <a:xfrm>
+            <a:off x="8383923" y="1378493"/>
+            <a:ext cx="3441032" cy="6882064"/>
+          </a:xfrm>
+          <a:prstGeom prst="rect">
+            <a:avLst/>
+          </a:prstGeom>
+          <a:ln>
+            <a:noFill/>
+          </a:ln>
+          <a:effectLst>
+            <a:outerShdw blurRad="292100" dist="139700" dir="2700000" algn="tl" rotWithShape="0">
+              <a:srgbClr val="333333">
+                <a:alpha val="65000"/>
+              </a:srgbClr>
+            </a:outerShdw>
+          </a:effectLst>
+        </p:spPr>
+      </p:pic>
+      <p:sp>
+        <p:nvSpPr>
+          <p:cNvPr id="18" name="TextBox 17">
+            <a:extLst>
+              <a:ext uri="{FF2B5EF4-FFF2-40B4-BE49-F238E27FC236}">
+                <a16:creationId xmlns:a16="http://schemas.microsoft.com/office/drawing/2014/main" id="{7437C719-0B61-C842-91FD-BB0A8F394140}"/>
+              </a:ext>
+            </a:extLst>
+          </p:cNvPr>
+          <p:cNvSpPr txBox="1"/>
+          <p:nvPr/>
+        </p:nvSpPr>
+        <p:spPr>
+          <a:xfrm>
+            <a:off x="3984939" y="380239"/>
+            <a:ext cx="3744936" cy="778098"/>
+          </a:xfrm>
+          <a:prstGeom prst="rect">
+            <a:avLst/>
+          </a:prstGeom>
+          <a:noFill/>
+        </p:spPr>
+        <p:txBody>
+          <a:bodyPr wrap="none" rtlCol="0">
+            <a:spAutoFit/>
+          </a:bodyPr>
+          <a:lstStyle/>
+          <a:p>
+            <a:pPr algn="ctr"/>
+            <a:r>
+              <a:rPr lang="en-US" sz="2814" i="1" dirty="0">
+                <a:latin typeface="Roboto" panose="02000000000000000000" pitchFamily="2" charset="0"/>
+                <a:ea typeface="Roboto" panose="02000000000000000000" pitchFamily="2" charset="0"/>
+              </a:rPr>
+              <a:t>Country Picker Dialogs</a:t>
+            </a:r>
+          </a:p>
+          <a:p>
+            <a:pPr algn="ctr"/>
+            <a:r>
+              <a:rPr lang="en-US" sz="1642" i="1" dirty="0">
+                <a:latin typeface="Roboto" panose="02000000000000000000" pitchFamily="2" charset="0"/>
+                <a:ea typeface="Roboto" panose="02000000000000000000" pitchFamily="2" charset="0"/>
+              </a:rPr>
+              <a:t>(Android Country Picker)</a:t>
+            </a:r>
+          </a:p>
+        </p:txBody>
+      </p:sp>
+    </p:spTree>
+    <p:extLst>
+      <p:ext uri="{BB962C8B-B14F-4D97-AF65-F5344CB8AC3E}">
+        <p14:creationId xmlns:p14="http://schemas.microsoft.com/office/powerpoint/2010/main" val="2220267063"/>
+      </p:ext>
+    </p:extLst>
+  </p:cSld>
+  <p:clrMapOvr>
+    <a:masterClrMapping/>
+  </p:clrMapOvr>
+</p:sld>
+</file>
+
 <file path=ppt/theme/theme1.xml><?xml version="1.0" encoding="utf-8"?>
 <a:theme xmlns:a="http://schemas.openxmlformats.org/drawingml/2006/main" name="Office Theme">
   <a:themeElements>

</xml_diff>